<commit_message>
Update materials with latest slide updates
</commit_message>
<xml_diff>
--- a/07/DATA515_07_SoftwareDesign.pptx
+++ b/07/DATA515_07_SoftwareDesign.pptx
@@ -55,16 +55,18 @@
     <p:sldId id="300" r:id="rId50"/>
     <p:sldId id="301" r:id="rId51"/>
     <p:sldId id="302" r:id="rId52"/>
+    <p:sldId id="303" r:id="rId53"/>
+    <p:sldId id="304" r:id="rId54"/>
   </p:sldIdLst>
   <p:sldSz cy="5143500" cx="9144000"/>
   <p:notesSz cx="6858000" cy="9144000"/>
   <p:embeddedFontLst>
     <p:embeddedFont>
       <p:font typeface="Roboto"/>
-      <p:regular r:id="rId53"/>
-      <p:bold r:id="rId54"/>
-      <p:italic r:id="rId55"/>
-      <p:boldItalic r:id="rId56"/>
+      <p:regular r:id="rId55"/>
+      <p:bold r:id="rId56"/>
+      <p:italic r:id="rId57"/>
+      <p:boldItalic r:id="rId58"/>
     </p:embeddedFont>
   </p:embeddedFontLst>
   <p:defaultTextStyle>
@@ -4225,7 +4227,7 @@
       </p:grpSpPr>
       <p:sp>
         <p:nvSpPr>
-          <p:cNvPr id="319" name="Google Shape;319;g208b0c039d9_0_87:notes"/>
+          <p:cNvPr id="319" name="Google Shape;319;g20844a3fcd2_0_19:notes"/>
           <p:cNvSpPr/>
           <p:nvPr>
             <p:ph idx="2" type="sldImg"/>
@@ -4260,7 +4262,7 @@
       </p:sp>
       <p:sp>
         <p:nvSpPr>
-          <p:cNvPr id="320" name="Google Shape;320;g208b0c039d9_0_87:notes"/>
+          <p:cNvPr id="320" name="Google Shape;320;g20844a3fcd2_0_19:notes"/>
           <p:cNvSpPr txBox="1"/>
           <p:nvPr>
             <p:ph idx="1" type="body"/>
@@ -4310,7 +4312,7 @@
   <p:cSld>
     <p:spTree>
       <p:nvGrpSpPr>
-        <p:cNvPr id="324" name="Shape 324"/>
+        <p:cNvPr id="323" name="Shape 323"/>
         <p:cNvGrpSpPr/>
         <p:nvPr/>
       </p:nvGrpSpPr>
@@ -4324,7 +4326,7 @@
       </p:grpSpPr>
       <p:sp>
         <p:nvSpPr>
-          <p:cNvPr id="325" name="Google Shape;325;g20844a3fcd2_0_19:notes"/>
+          <p:cNvPr id="324" name="Google Shape;324;g208b0c039d9_0_138:notes"/>
           <p:cNvSpPr/>
           <p:nvPr>
             <p:ph idx="2" type="sldImg"/>
@@ -4359,7 +4361,7 @@
       </p:sp>
       <p:sp>
         <p:nvSpPr>
-          <p:cNvPr id="326" name="Google Shape;326;g20844a3fcd2_0_19:notes"/>
+          <p:cNvPr id="325" name="Google Shape;325;g208b0c039d9_0_138:notes"/>
           <p:cNvSpPr txBox="1"/>
           <p:nvPr>
             <p:ph idx="1" type="body"/>
@@ -4423,7 +4425,7 @@
       </p:grpSpPr>
       <p:sp>
         <p:nvSpPr>
-          <p:cNvPr id="330" name="Google Shape;330;g208b0c039d9_0_138:notes"/>
+          <p:cNvPr id="330" name="Google Shape;330;g208b0c039d9_0_159:notes"/>
           <p:cNvSpPr/>
           <p:nvPr>
             <p:ph idx="2" type="sldImg"/>
@@ -4458,7 +4460,7 @@
       </p:sp>
       <p:sp>
         <p:nvSpPr>
-          <p:cNvPr id="331" name="Google Shape;331;g208b0c039d9_0_138:notes"/>
+          <p:cNvPr id="331" name="Google Shape;331;g208b0c039d9_0_159:notes"/>
           <p:cNvSpPr txBox="1"/>
           <p:nvPr>
             <p:ph idx="1" type="body"/>
@@ -4522,7 +4524,7 @@
       </p:grpSpPr>
       <p:sp>
         <p:nvSpPr>
-          <p:cNvPr id="336" name="Google Shape;336;g208b0c039d9_0_159:notes"/>
+          <p:cNvPr id="336" name="Google Shape;336;g208b0c039d9_0_176:notes"/>
           <p:cNvSpPr/>
           <p:nvPr>
             <p:ph idx="2" type="sldImg"/>
@@ -4557,7 +4559,7 @@
       </p:sp>
       <p:sp>
         <p:nvSpPr>
-          <p:cNvPr id="337" name="Google Shape;337;g208b0c039d9_0_159:notes"/>
+          <p:cNvPr id="337" name="Google Shape;337;g208b0c039d9_0_176:notes"/>
           <p:cNvSpPr txBox="1"/>
           <p:nvPr>
             <p:ph idx="1" type="body"/>
@@ -4819,7 +4821,7 @@
       </p:grpSpPr>
       <p:sp>
         <p:nvSpPr>
-          <p:cNvPr id="354" name="Google Shape;354;g20844a3fcd2_0_24:notes"/>
+          <p:cNvPr id="354" name="Google Shape;354;g208b0c039d9_0_170:notes"/>
           <p:cNvSpPr/>
           <p:nvPr>
             <p:ph idx="2" type="sldImg"/>
@@ -4854,7 +4856,205 @@
       </p:sp>
       <p:sp>
         <p:nvSpPr>
-          <p:cNvPr id="355" name="Google Shape;355;g20844a3fcd2_0_24:notes"/>
+          <p:cNvPr id="355" name="Google Shape;355;g208b0c039d9_0_170:notes"/>
+          <p:cNvSpPr txBox="1"/>
+          <p:nvPr>
+            <p:ph idx="1" type="body"/>
+          </p:nvPr>
+        </p:nvSpPr>
+        <p:spPr>
+          <a:xfrm>
+            <a:off x="685800" y="4343400"/>
+            <a:ext cx="5486400" cy="4114800"/>
+          </a:xfrm>
+          <a:prstGeom prst="rect">
+            <a:avLst/>
+          </a:prstGeom>
+        </p:spPr>
+        <p:txBody>
+          <a:bodyPr anchorCtr="0" anchor="t" bIns="91425" lIns="91425" spcFirstLastPara="1" rIns="91425" wrap="square" tIns="91425">
+            <a:noAutofit/>
+          </a:bodyPr>
+          <a:lstStyle/>
+          <a:p>
+            <a:pPr indent="0" lvl="0" marL="0" rtl="0" algn="l">
+              <a:spcBef>
+                <a:spcPts val="0"/>
+              </a:spcBef>
+              <a:spcAft>
+                <a:spcPts val="0"/>
+              </a:spcAft>
+              <a:buNone/>
+            </a:pPr>
+            <a:r>
+              <a:t/>
+            </a:r>
+            <a:endParaRPr/>
+          </a:p>
+        </p:txBody>
+      </p:sp>
+    </p:spTree>
+  </p:cSld>
+  <p:clrMapOvr>
+    <a:masterClrMapping/>
+  </p:clrMapOvr>
+</p:notes>
+</file>
+
+<file path=ppt/notesSlides/notesSlide48.xml><?xml version="1.0" encoding="utf-8"?>
+<p:notes xmlns:a="http://schemas.openxmlformats.org/drawingml/2006/main" xmlns:r="http://schemas.openxmlformats.org/officeDocument/2006/relationships" xmlns:mc="http://schemas.openxmlformats.org/markup-compatibility/2006" xmlns:mv="urn:schemas-microsoft-com:mac:vml" xmlns:p="http://schemas.openxmlformats.org/presentationml/2006/main" xmlns:c="http://schemas.openxmlformats.org/drawingml/2006/chart" xmlns:dgm="http://schemas.openxmlformats.org/drawingml/2006/diagram" xmlns:o="urn:schemas-microsoft-com:office:office" xmlns:v="urn:schemas-microsoft-com:vml" xmlns:pvml="urn:schemas-microsoft-com:office:powerpoint" xmlns:com="http://schemas.openxmlformats.org/drawingml/2006/compatibility" xmlns:p14="http://schemas.microsoft.com/office/powerpoint/2010/main" xmlns:p15="http://schemas.microsoft.com/office/powerpoint/2012/main" xmlns:ahyp="http://schemas.microsoft.com/office/drawing/2018/hyperlinkcolor" showMasterPhAnim="0" showMasterSp="0">
+  <p:cSld>
+    <p:spTree>
+      <p:nvGrpSpPr>
+        <p:cNvPr id="359" name="Shape 359"/>
+        <p:cNvGrpSpPr/>
+        <p:nvPr/>
+      </p:nvGrpSpPr>
+      <p:grpSpPr>
+        <a:xfrm>
+          <a:off x="0" y="0"/>
+          <a:ext cx="0" cy="0"/>
+          <a:chOff x="0" y="0"/>
+          <a:chExt cx="0" cy="0"/>
+        </a:xfrm>
+      </p:grpSpPr>
+      <p:sp>
+        <p:nvSpPr>
+          <p:cNvPr id="360" name="Google Shape;360;g20844a3fcd2_0_24:notes"/>
+          <p:cNvSpPr/>
+          <p:nvPr>
+            <p:ph idx="2" type="sldImg"/>
+          </p:nvPr>
+        </p:nvSpPr>
+        <p:spPr>
+          <a:xfrm>
+            <a:off x="381300" y="685800"/>
+            <a:ext cx="6096000" cy="3429000"/>
+          </a:xfrm>
+          <a:custGeom>
+            <a:rect b="b" l="l" r="r" t="t"/>
+            <a:pathLst>
+              <a:path extrusionOk="0" h="120000" w="120000">
+                <a:moveTo>
+                  <a:pt x="0" y="0"/>
+                </a:moveTo>
+                <a:lnTo>
+                  <a:pt x="120000" y="0"/>
+                </a:lnTo>
+                <a:lnTo>
+                  <a:pt x="120000" y="120000"/>
+                </a:lnTo>
+                <a:lnTo>
+                  <a:pt x="0" y="120000"/>
+                </a:lnTo>
+                <a:close/>
+              </a:path>
+            </a:pathLst>
+          </a:custGeom>
+        </p:spPr>
+      </p:sp>
+      <p:sp>
+        <p:nvSpPr>
+          <p:cNvPr id="361" name="Google Shape;361;g20844a3fcd2_0_24:notes"/>
+          <p:cNvSpPr txBox="1"/>
+          <p:nvPr>
+            <p:ph idx="1" type="body"/>
+          </p:nvPr>
+        </p:nvSpPr>
+        <p:spPr>
+          <a:xfrm>
+            <a:off x="685800" y="4343400"/>
+            <a:ext cx="5486400" cy="4114800"/>
+          </a:xfrm>
+          <a:prstGeom prst="rect">
+            <a:avLst/>
+          </a:prstGeom>
+        </p:spPr>
+        <p:txBody>
+          <a:bodyPr anchorCtr="0" anchor="t" bIns="91425" lIns="91425" spcFirstLastPara="1" rIns="91425" wrap="square" tIns="91425">
+            <a:noAutofit/>
+          </a:bodyPr>
+          <a:lstStyle/>
+          <a:p>
+            <a:pPr indent="0" lvl="0" marL="0" rtl="0" algn="l">
+              <a:spcBef>
+                <a:spcPts val="0"/>
+              </a:spcBef>
+              <a:spcAft>
+                <a:spcPts val="0"/>
+              </a:spcAft>
+              <a:buNone/>
+            </a:pPr>
+            <a:r>
+              <a:t/>
+            </a:r>
+            <a:endParaRPr/>
+          </a:p>
+        </p:txBody>
+      </p:sp>
+    </p:spTree>
+  </p:cSld>
+  <p:clrMapOvr>
+    <a:masterClrMapping/>
+  </p:clrMapOvr>
+</p:notes>
+</file>
+
+<file path=ppt/notesSlides/notesSlide49.xml><?xml version="1.0" encoding="utf-8"?>
+<p:notes xmlns:a="http://schemas.openxmlformats.org/drawingml/2006/main" xmlns:r="http://schemas.openxmlformats.org/officeDocument/2006/relationships" xmlns:mc="http://schemas.openxmlformats.org/markup-compatibility/2006" xmlns:mv="urn:schemas-microsoft-com:mac:vml" xmlns:p="http://schemas.openxmlformats.org/presentationml/2006/main" xmlns:c="http://schemas.openxmlformats.org/drawingml/2006/chart" xmlns:dgm="http://schemas.openxmlformats.org/drawingml/2006/diagram" xmlns:o="urn:schemas-microsoft-com:office:office" xmlns:v="urn:schemas-microsoft-com:vml" xmlns:pvml="urn:schemas-microsoft-com:office:powerpoint" xmlns:com="http://schemas.openxmlformats.org/drawingml/2006/compatibility" xmlns:p14="http://schemas.microsoft.com/office/powerpoint/2010/main" xmlns:p15="http://schemas.microsoft.com/office/powerpoint/2012/main" xmlns:ahyp="http://schemas.microsoft.com/office/drawing/2018/hyperlinkcolor" showMasterPhAnim="0" showMasterSp="0">
+  <p:cSld>
+    <p:spTree>
+      <p:nvGrpSpPr>
+        <p:cNvPr id="365" name="Shape 365"/>
+        <p:cNvGrpSpPr/>
+        <p:nvPr/>
+      </p:nvGrpSpPr>
+      <p:grpSpPr>
+        <a:xfrm>
+          <a:off x="0" y="0"/>
+          <a:ext cx="0" cy="0"/>
+          <a:chOff x="0" y="0"/>
+          <a:chExt cx="0" cy="0"/>
+        </a:xfrm>
+      </p:grpSpPr>
+      <p:sp>
+        <p:nvSpPr>
+          <p:cNvPr id="366" name="Google Shape;366;g208b0c039d9_0_87:notes"/>
+          <p:cNvSpPr/>
+          <p:nvPr>
+            <p:ph idx="2" type="sldImg"/>
+          </p:nvPr>
+        </p:nvSpPr>
+        <p:spPr>
+          <a:xfrm>
+            <a:off x="381300" y="685800"/>
+            <a:ext cx="6096000" cy="3429000"/>
+          </a:xfrm>
+          <a:custGeom>
+            <a:rect b="b" l="l" r="r" t="t"/>
+            <a:pathLst>
+              <a:path extrusionOk="0" h="120000" w="120000">
+                <a:moveTo>
+                  <a:pt x="0" y="0"/>
+                </a:moveTo>
+                <a:lnTo>
+                  <a:pt x="120000" y="0"/>
+                </a:lnTo>
+                <a:lnTo>
+                  <a:pt x="120000" y="120000"/>
+                </a:lnTo>
+                <a:lnTo>
+                  <a:pt x="0" y="120000"/>
+                </a:lnTo>
+                <a:close/>
+              </a:path>
+            </a:pathLst>
+          </a:custGeom>
+        </p:spPr>
+      </p:sp>
+      <p:sp>
+        <p:nvSpPr>
+          <p:cNvPr id="367" name="Google Shape;367;g208b0c039d9_0_87:notes"/>
           <p:cNvSpPr txBox="1"/>
           <p:nvPr>
             <p:ph idx="1" type="body"/>
@@ -11668,6 +11868,23 @@
             </a:r>
             <a:endParaRPr sz="2200"/>
           </a:p>
+          <a:p>
+            <a:pPr indent="-368300" lvl="0" marL="457200" rtl="0" algn="l">
+              <a:spcBef>
+                <a:spcPts val="0"/>
+              </a:spcBef>
+              <a:spcAft>
+                <a:spcPts val="0"/>
+              </a:spcAft>
+              <a:buSzPts val="2200"/>
+              <a:buChar char="●"/>
+            </a:pPr>
+            <a:r>
+              <a:rPr lang="en" sz="2200"/>
+              <a:t>Build an understandable, extendable, maintainable system</a:t>
+            </a:r>
+            <a:endParaRPr sz="2200"/>
+          </a:p>
         </p:txBody>
       </p:sp>
     </p:spTree>
@@ -14684,7 +14901,7 @@
             </a:r>
             <a:r>
               <a:rPr lang="en" sz="2200"/>
-              <a:t>.</a:t>
+              <a:t> - from the point of view of a user, how will they use your system?</a:t>
             </a:r>
             <a:endParaRPr sz="2200"/>
           </a:p>
@@ -16621,6 +16838,585 @@
   <p:clrMapOvr>
     <a:masterClrMapping/>
   </p:clrMapOvr>
+  <p:timing>
+    <p:tnLst>
+      <p:par>
+        <p:cTn dur="indefinite" nodeType="tmRoot" restart="never">
+          <p:childTnLst>
+            <p:seq concurrent="1" nextAc="seek">
+              <p:cTn dur="indefinite" id="2" nodeType="mainSeq">
+                <p:childTnLst>
+                  <p:par>
+                    <p:cTn fill="hold">
+                      <p:stCondLst>
+                        <p:cond delay="indefinite"/>
+                      </p:stCondLst>
+                      <p:childTnLst>
+                        <p:par>
+                          <p:cTn fill="hold">
+                            <p:stCondLst>
+                              <p:cond delay="0"/>
+                            </p:stCondLst>
+                            <p:childTnLst>
+                              <p:par>
+                                <p:cTn fill="hold" nodeType="clickEffect" presetClass="entr" presetID="10" presetSubtype="0">
+                                  <p:stCondLst>
+                                    <p:cond delay="0"/>
+                                  </p:stCondLst>
+                                  <p:childTnLst>
+                                    <p:set>
+                                      <p:cBhvr>
+                                        <p:cTn dur="1" fill="hold">
+                                          <p:stCondLst>
+                                            <p:cond delay="0"/>
+                                          </p:stCondLst>
+                                        </p:cTn>
+                                        <p:tgtEl>
+                                          <p:spTgt spid="251">
+                                            <p:txEl>
+                                              <p:pRg end="0" st="0"/>
+                                            </p:txEl>
+                                          </p:spTgt>
+                                        </p:tgtEl>
+                                        <p:attrNameLst>
+                                          <p:attrName>style.visibility</p:attrName>
+                                        </p:attrNameLst>
+                                      </p:cBhvr>
+                                      <p:to>
+                                        <p:strVal val="visible"/>
+                                      </p:to>
+                                    </p:set>
+                                    <p:animEffect filter="fade" transition="in">
+                                      <p:cBhvr>
+                                        <p:cTn dur="1"/>
+                                        <p:tgtEl>
+                                          <p:spTgt spid="251">
+                                            <p:txEl>
+                                              <p:pRg end="0" st="0"/>
+                                            </p:txEl>
+                                          </p:spTgt>
+                                        </p:tgtEl>
+                                      </p:cBhvr>
+                                    </p:animEffect>
+                                  </p:childTnLst>
+                                </p:cTn>
+                              </p:par>
+                            </p:childTnLst>
+                          </p:cTn>
+                        </p:par>
+                      </p:childTnLst>
+                    </p:cTn>
+                  </p:par>
+                  <p:par>
+                    <p:cTn fill="hold">
+                      <p:stCondLst>
+                        <p:cond delay="indefinite"/>
+                      </p:stCondLst>
+                      <p:childTnLst>
+                        <p:par>
+                          <p:cTn fill="hold">
+                            <p:stCondLst>
+                              <p:cond delay="0"/>
+                            </p:stCondLst>
+                            <p:childTnLst>
+                              <p:par>
+                                <p:cTn fill="hold" nodeType="clickEffect" presetClass="entr" presetID="10" presetSubtype="0">
+                                  <p:stCondLst>
+                                    <p:cond delay="0"/>
+                                  </p:stCondLst>
+                                  <p:childTnLst>
+                                    <p:set>
+                                      <p:cBhvr>
+                                        <p:cTn dur="1" fill="hold">
+                                          <p:stCondLst>
+                                            <p:cond delay="0"/>
+                                          </p:stCondLst>
+                                        </p:cTn>
+                                        <p:tgtEl>
+                                          <p:spTgt spid="251">
+                                            <p:txEl>
+                                              <p:pRg end="1" st="1"/>
+                                            </p:txEl>
+                                          </p:spTgt>
+                                        </p:tgtEl>
+                                        <p:attrNameLst>
+                                          <p:attrName>style.visibility</p:attrName>
+                                        </p:attrNameLst>
+                                      </p:cBhvr>
+                                      <p:to>
+                                        <p:strVal val="visible"/>
+                                      </p:to>
+                                    </p:set>
+                                    <p:animEffect filter="fade" transition="in">
+                                      <p:cBhvr>
+                                        <p:cTn dur="1"/>
+                                        <p:tgtEl>
+                                          <p:spTgt spid="251">
+                                            <p:txEl>
+                                              <p:pRg end="1" st="1"/>
+                                            </p:txEl>
+                                          </p:spTgt>
+                                        </p:tgtEl>
+                                      </p:cBhvr>
+                                    </p:animEffect>
+                                  </p:childTnLst>
+                                </p:cTn>
+                              </p:par>
+                            </p:childTnLst>
+                          </p:cTn>
+                        </p:par>
+                      </p:childTnLst>
+                    </p:cTn>
+                  </p:par>
+                  <p:par>
+                    <p:cTn fill="hold">
+                      <p:stCondLst>
+                        <p:cond delay="indefinite"/>
+                      </p:stCondLst>
+                      <p:childTnLst>
+                        <p:par>
+                          <p:cTn fill="hold">
+                            <p:stCondLst>
+                              <p:cond delay="0"/>
+                            </p:stCondLst>
+                            <p:childTnLst>
+                              <p:par>
+                                <p:cTn fill="hold" nodeType="clickEffect" presetClass="entr" presetID="10" presetSubtype="0">
+                                  <p:stCondLst>
+                                    <p:cond delay="0"/>
+                                  </p:stCondLst>
+                                  <p:childTnLst>
+                                    <p:set>
+                                      <p:cBhvr>
+                                        <p:cTn dur="1" fill="hold">
+                                          <p:stCondLst>
+                                            <p:cond delay="0"/>
+                                          </p:stCondLst>
+                                        </p:cTn>
+                                        <p:tgtEl>
+                                          <p:spTgt spid="251">
+                                            <p:txEl>
+                                              <p:pRg end="2" st="2"/>
+                                            </p:txEl>
+                                          </p:spTgt>
+                                        </p:tgtEl>
+                                        <p:attrNameLst>
+                                          <p:attrName>style.visibility</p:attrName>
+                                        </p:attrNameLst>
+                                      </p:cBhvr>
+                                      <p:to>
+                                        <p:strVal val="visible"/>
+                                      </p:to>
+                                    </p:set>
+                                    <p:animEffect filter="fade" transition="in">
+                                      <p:cBhvr>
+                                        <p:cTn dur="1"/>
+                                        <p:tgtEl>
+                                          <p:spTgt spid="251">
+                                            <p:txEl>
+                                              <p:pRg end="2" st="2"/>
+                                            </p:txEl>
+                                          </p:spTgt>
+                                        </p:tgtEl>
+                                      </p:cBhvr>
+                                    </p:animEffect>
+                                  </p:childTnLst>
+                                </p:cTn>
+                              </p:par>
+                            </p:childTnLst>
+                          </p:cTn>
+                        </p:par>
+                      </p:childTnLst>
+                    </p:cTn>
+                  </p:par>
+                  <p:par>
+                    <p:cTn fill="hold">
+                      <p:stCondLst>
+                        <p:cond delay="indefinite"/>
+                      </p:stCondLst>
+                      <p:childTnLst>
+                        <p:par>
+                          <p:cTn fill="hold">
+                            <p:stCondLst>
+                              <p:cond delay="0"/>
+                            </p:stCondLst>
+                            <p:childTnLst>
+                              <p:par>
+                                <p:cTn fill="hold" nodeType="clickEffect" presetClass="entr" presetID="10" presetSubtype="0">
+                                  <p:stCondLst>
+                                    <p:cond delay="0"/>
+                                  </p:stCondLst>
+                                  <p:childTnLst>
+                                    <p:set>
+                                      <p:cBhvr>
+                                        <p:cTn dur="1" fill="hold">
+                                          <p:stCondLst>
+                                            <p:cond delay="0"/>
+                                          </p:stCondLst>
+                                        </p:cTn>
+                                        <p:tgtEl>
+                                          <p:spTgt spid="251">
+                                            <p:txEl>
+                                              <p:pRg end="3" st="3"/>
+                                            </p:txEl>
+                                          </p:spTgt>
+                                        </p:tgtEl>
+                                        <p:attrNameLst>
+                                          <p:attrName>style.visibility</p:attrName>
+                                        </p:attrNameLst>
+                                      </p:cBhvr>
+                                      <p:to>
+                                        <p:strVal val="visible"/>
+                                      </p:to>
+                                    </p:set>
+                                    <p:animEffect filter="fade" transition="in">
+                                      <p:cBhvr>
+                                        <p:cTn dur="1"/>
+                                        <p:tgtEl>
+                                          <p:spTgt spid="251">
+                                            <p:txEl>
+                                              <p:pRg end="3" st="3"/>
+                                            </p:txEl>
+                                          </p:spTgt>
+                                        </p:tgtEl>
+                                      </p:cBhvr>
+                                    </p:animEffect>
+                                  </p:childTnLst>
+                                </p:cTn>
+                              </p:par>
+                            </p:childTnLst>
+                          </p:cTn>
+                        </p:par>
+                      </p:childTnLst>
+                    </p:cTn>
+                  </p:par>
+                  <p:par>
+                    <p:cTn fill="hold">
+                      <p:stCondLst>
+                        <p:cond delay="indefinite"/>
+                      </p:stCondLst>
+                      <p:childTnLst>
+                        <p:par>
+                          <p:cTn fill="hold">
+                            <p:stCondLst>
+                              <p:cond delay="0"/>
+                            </p:stCondLst>
+                            <p:childTnLst>
+                              <p:par>
+                                <p:cTn fill="hold" nodeType="clickEffect" presetClass="entr" presetID="10" presetSubtype="0">
+                                  <p:stCondLst>
+                                    <p:cond delay="0"/>
+                                  </p:stCondLst>
+                                  <p:childTnLst>
+                                    <p:set>
+                                      <p:cBhvr>
+                                        <p:cTn dur="1" fill="hold">
+                                          <p:stCondLst>
+                                            <p:cond delay="0"/>
+                                          </p:stCondLst>
+                                        </p:cTn>
+                                        <p:tgtEl>
+                                          <p:spTgt spid="251">
+                                            <p:txEl>
+                                              <p:pRg end="4" st="4"/>
+                                            </p:txEl>
+                                          </p:spTgt>
+                                        </p:tgtEl>
+                                        <p:attrNameLst>
+                                          <p:attrName>style.visibility</p:attrName>
+                                        </p:attrNameLst>
+                                      </p:cBhvr>
+                                      <p:to>
+                                        <p:strVal val="visible"/>
+                                      </p:to>
+                                    </p:set>
+                                    <p:animEffect filter="fade" transition="in">
+                                      <p:cBhvr>
+                                        <p:cTn dur="1"/>
+                                        <p:tgtEl>
+                                          <p:spTgt spid="251">
+                                            <p:txEl>
+                                              <p:pRg end="4" st="4"/>
+                                            </p:txEl>
+                                          </p:spTgt>
+                                        </p:tgtEl>
+                                      </p:cBhvr>
+                                    </p:animEffect>
+                                  </p:childTnLst>
+                                </p:cTn>
+                              </p:par>
+                            </p:childTnLst>
+                          </p:cTn>
+                        </p:par>
+                      </p:childTnLst>
+                    </p:cTn>
+                  </p:par>
+                  <p:par>
+                    <p:cTn fill="hold">
+                      <p:stCondLst>
+                        <p:cond delay="indefinite"/>
+                      </p:stCondLst>
+                      <p:childTnLst>
+                        <p:par>
+                          <p:cTn fill="hold">
+                            <p:stCondLst>
+                              <p:cond delay="0"/>
+                            </p:stCondLst>
+                            <p:childTnLst>
+                              <p:par>
+                                <p:cTn fill="hold" nodeType="clickEffect" presetClass="entr" presetID="10" presetSubtype="0">
+                                  <p:stCondLst>
+                                    <p:cond delay="0"/>
+                                  </p:stCondLst>
+                                  <p:childTnLst>
+                                    <p:set>
+                                      <p:cBhvr>
+                                        <p:cTn dur="1" fill="hold">
+                                          <p:stCondLst>
+                                            <p:cond delay="0"/>
+                                          </p:stCondLst>
+                                        </p:cTn>
+                                        <p:tgtEl>
+                                          <p:spTgt spid="251">
+                                            <p:txEl>
+                                              <p:pRg end="5" st="5"/>
+                                            </p:txEl>
+                                          </p:spTgt>
+                                        </p:tgtEl>
+                                        <p:attrNameLst>
+                                          <p:attrName>style.visibility</p:attrName>
+                                        </p:attrNameLst>
+                                      </p:cBhvr>
+                                      <p:to>
+                                        <p:strVal val="visible"/>
+                                      </p:to>
+                                    </p:set>
+                                    <p:animEffect filter="fade" transition="in">
+                                      <p:cBhvr>
+                                        <p:cTn dur="1"/>
+                                        <p:tgtEl>
+                                          <p:spTgt spid="251">
+                                            <p:txEl>
+                                              <p:pRg end="5" st="5"/>
+                                            </p:txEl>
+                                          </p:spTgt>
+                                        </p:tgtEl>
+                                      </p:cBhvr>
+                                    </p:animEffect>
+                                  </p:childTnLst>
+                                </p:cTn>
+                              </p:par>
+                            </p:childTnLst>
+                          </p:cTn>
+                        </p:par>
+                      </p:childTnLst>
+                    </p:cTn>
+                  </p:par>
+                  <p:par>
+                    <p:cTn fill="hold">
+                      <p:stCondLst>
+                        <p:cond delay="indefinite"/>
+                      </p:stCondLst>
+                      <p:childTnLst>
+                        <p:par>
+                          <p:cTn fill="hold">
+                            <p:stCondLst>
+                              <p:cond delay="0"/>
+                            </p:stCondLst>
+                            <p:childTnLst>
+                              <p:par>
+                                <p:cTn fill="hold" nodeType="clickEffect" presetClass="entr" presetID="10" presetSubtype="0">
+                                  <p:stCondLst>
+                                    <p:cond delay="0"/>
+                                  </p:stCondLst>
+                                  <p:childTnLst>
+                                    <p:set>
+                                      <p:cBhvr>
+                                        <p:cTn dur="1" fill="hold">
+                                          <p:stCondLst>
+                                            <p:cond delay="0"/>
+                                          </p:stCondLst>
+                                        </p:cTn>
+                                        <p:tgtEl>
+                                          <p:spTgt spid="251">
+                                            <p:txEl>
+                                              <p:pRg end="6" st="6"/>
+                                            </p:txEl>
+                                          </p:spTgt>
+                                        </p:tgtEl>
+                                        <p:attrNameLst>
+                                          <p:attrName>style.visibility</p:attrName>
+                                        </p:attrNameLst>
+                                      </p:cBhvr>
+                                      <p:to>
+                                        <p:strVal val="visible"/>
+                                      </p:to>
+                                    </p:set>
+                                    <p:animEffect filter="fade" transition="in">
+                                      <p:cBhvr>
+                                        <p:cTn dur="1"/>
+                                        <p:tgtEl>
+                                          <p:spTgt spid="251">
+                                            <p:txEl>
+                                              <p:pRg end="6" st="6"/>
+                                            </p:txEl>
+                                          </p:spTgt>
+                                        </p:tgtEl>
+                                      </p:cBhvr>
+                                    </p:animEffect>
+                                  </p:childTnLst>
+                                </p:cTn>
+                              </p:par>
+                            </p:childTnLst>
+                          </p:cTn>
+                        </p:par>
+                      </p:childTnLst>
+                    </p:cTn>
+                  </p:par>
+                  <p:par>
+                    <p:cTn fill="hold">
+                      <p:stCondLst>
+                        <p:cond delay="indefinite"/>
+                      </p:stCondLst>
+                      <p:childTnLst>
+                        <p:par>
+                          <p:cTn fill="hold">
+                            <p:stCondLst>
+                              <p:cond delay="0"/>
+                            </p:stCondLst>
+                            <p:childTnLst>
+                              <p:par>
+                                <p:cTn fill="hold" nodeType="clickEffect" presetClass="entr" presetID="10" presetSubtype="0">
+                                  <p:stCondLst>
+                                    <p:cond delay="0"/>
+                                  </p:stCondLst>
+                                  <p:childTnLst>
+                                    <p:set>
+                                      <p:cBhvr>
+                                        <p:cTn dur="1" fill="hold">
+                                          <p:stCondLst>
+                                            <p:cond delay="0"/>
+                                          </p:stCondLst>
+                                        </p:cTn>
+                                        <p:tgtEl>
+                                          <p:spTgt spid="251">
+                                            <p:txEl>
+                                              <p:pRg end="7" st="7"/>
+                                            </p:txEl>
+                                          </p:spTgt>
+                                        </p:tgtEl>
+                                        <p:attrNameLst>
+                                          <p:attrName>style.visibility</p:attrName>
+                                        </p:attrNameLst>
+                                      </p:cBhvr>
+                                      <p:to>
+                                        <p:strVal val="visible"/>
+                                      </p:to>
+                                    </p:set>
+                                    <p:animEffect filter="fade" transition="in">
+                                      <p:cBhvr>
+                                        <p:cTn dur="1"/>
+                                        <p:tgtEl>
+                                          <p:spTgt spid="251">
+                                            <p:txEl>
+                                              <p:pRg end="7" st="7"/>
+                                            </p:txEl>
+                                          </p:spTgt>
+                                        </p:tgtEl>
+                                      </p:cBhvr>
+                                    </p:animEffect>
+                                  </p:childTnLst>
+                                </p:cTn>
+                              </p:par>
+                            </p:childTnLst>
+                          </p:cTn>
+                        </p:par>
+                      </p:childTnLst>
+                    </p:cTn>
+                  </p:par>
+                  <p:par>
+                    <p:cTn fill="hold">
+                      <p:stCondLst>
+                        <p:cond delay="indefinite"/>
+                      </p:stCondLst>
+                      <p:childTnLst>
+                        <p:par>
+                          <p:cTn fill="hold">
+                            <p:stCondLst>
+                              <p:cond delay="0"/>
+                            </p:stCondLst>
+                            <p:childTnLst>
+                              <p:par>
+                                <p:cTn fill="hold" nodeType="clickEffect" presetClass="entr" presetID="10" presetSubtype="0">
+                                  <p:stCondLst>
+                                    <p:cond delay="0"/>
+                                  </p:stCondLst>
+                                  <p:childTnLst>
+                                    <p:set>
+                                      <p:cBhvr>
+                                        <p:cTn dur="1" fill="hold">
+                                          <p:stCondLst>
+                                            <p:cond delay="0"/>
+                                          </p:stCondLst>
+                                        </p:cTn>
+                                        <p:tgtEl>
+                                          <p:spTgt spid="251">
+                                            <p:txEl>
+                                              <p:pRg end="8" st="8"/>
+                                            </p:txEl>
+                                          </p:spTgt>
+                                        </p:tgtEl>
+                                        <p:attrNameLst>
+                                          <p:attrName>style.visibility</p:attrName>
+                                        </p:attrNameLst>
+                                      </p:cBhvr>
+                                      <p:to>
+                                        <p:strVal val="visible"/>
+                                      </p:to>
+                                    </p:set>
+                                    <p:animEffect filter="fade" transition="in">
+                                      <p:cBhvr>
+                                        <p:cTn dur="1"/>
+                                        <p:tgtEl>
+                                          <p:spTgt spid="251">
+                                            <p:txEl>
+                                              <p:pRg end="8" st="8"/>
+                                            </p:txEl>
+                                          </p:spTgt>
+                                        </p:tgtEl>
+                                      </p:cBhvr>
+                                    </p:animEffect>
+                                  </p:childTnLst>
+                                </p:cTn>
+                              </p:par>
+                            </p:childTnLst>
+                          </p:cTn>
+                        </p:par>
+                      </p:childTnLst>
+                    </p:cTn>
+                  </p:par>
+                </p:childTnLst>
+              </p:cTn>
+              <p:prevCondLst>
+                <p:cond evt="onPrev">
+                  <p:tgtEl>
+                    <p:sldTgt/>
+                  </p:tgtEl>
+                </p:cond>
+              </p:prevCondLst>
+              <p:nextCondLst>
+                <p:cond evt="onNext">
+                  <p:tgtEl>
+                    <p:sldTgt/>
+                  </p:tgtEl>
+                </p:cond>
+              </p:nextCondLst>
+            </p:seq>
+          </p:childTnLst>
+        </p:cTn>
+      </p:par>
+    </p:tnLst>
+  </p:timing>
 </p:sld>
 </file>
 
@@ -16675,7 +17471,7 @@
             </a:pPr>
             <a:r>
               <a:rPr lang="en"/>
-              <a:t>Example: ATM authentication</a:t>
+              <a:t>Example: ATM authentication use case</a:t>
             </a:r>
             <a:endParaRPr/>
           </a:p>
@@ -17461,7 +18257,7 @@
             </a:pPr>
             <a:r>
               <a:rPr lang="en"/>
-              <a:t>Example: ATM withdrawal</a:t>
+              <a:t>Example: ATM withdrawal use case</a:t>
             </a:r>
             <a:endParaRPr/>
           </a:p>
@@ -19817,6 +20613,52 @@
                 <a:spcPts val="1200"/>
               </a:spcBef>
               <a:spcAft>
+                <a:spcPts val="0"/>
+              </a:spcAft>
+              <a:buNone/>
+            </a:pPr>
+            <a:r>
+              <a:t/>
+            </a:r>
+            <a:endParaRPr sz="2400"/>
+          </a:p>
+          <a:p>
+            <a:pPr indent="0" lvl="0" marL="0" rtl="0" algn="l">
+              <a:spcBef>
+                <a:spcPts val="1200"/>
+              </a:spcBef>
+              <a:spcAft>
+                <a:spcPts val="0"/>
+              </a:spcAft>
+              <a:buNone/>
+            </a:pPr>
+            <a:r>
+              <a:t/>
+            </a:r>
+            <a:endParaRPr sz="2400"/>
+          </a:p>
+          <a:p>
+            <a:pPr indent="0" lvl="0" marL="0" rtl="0" algn="l">
+              <a:spcBef>
+                <a:spcPts val="1200"/>
+              </a:spcBef>
+              <a:spcAft>
+                <a:spcPts val="0"/>
+              </a:spcAft>
+              <a:buNone/>
+            </a:pPr>
+            <a:r>
+              <a:rPr lang="en" sz="2400"/>
+              <a:t>We’re not picky on the format you use!</a:t>
+            </a:r>
+            <a:endParaRPr sz="2400"/>
+          </a:p>
+          <a:p>
+            <a:pPr indent="0" lvl="0" marL="0" rtl="0" algn="l">
+              <a:spcBef>
+                <a:spcPts val="1200"/>
+              </a:spcBef>
+              <a:spcAft>
                 <a:spcPts val="1200"/>
               </a:spcAft>
               <a:buNone/>
@@ -20169,7 +21011,7 @@
         </p:nvSpPr>
         <p:spPr>
           <a:xfrm>
-            <a:off x="311700" y="445025"/>
+            <a:off x="311700" y="2285400"/>
             <a:ext cx="8520600" cy="572700"/>
           </a:xfrm>
           <a:prstGeom prst="rect">
@@ -20178,165 +21020,24 @@
         </p:spPr>
         <p:txBody>
           <a:bodyPr anchorCtr="0" anchor="t" bIns="91425" lIns="91425" spcFirstLastPara="1" rIns="91425" wrap="square" tIns="91425">
-            <a:noAutofit/>
+            <a:normAutofit fontScale="90000"/>
           </a:bodyPr>
           <a:lstStyle/>
           <a:p>
-            <a:pPr indent="0" lvl="0" marL="0" rtl="0" algn="l">
-              <a:spcBef>
-                <a:spcPts val="0"/>
-              </a:spcBef>
-              <a:spcAft>
-                <a:spcPts val="0"/>
-              </a:spcAft>
-              <a:buSzPts val="990"/>
-              <a:buNone/>
-            </a:pPr>
-            <a:r>
-              <a:rPr lang="en" sz="2620"/>
-              <a:t>Exercise: Your Components</a:t>
-            </a:r>
-            <a:endParaRPr sz="2620"/>
-          </a:p>
-        </p:txBody>
-      </p:sp>
-      <p:sp>
-        <p:nvSpPr>
-          <p:cNvPr id="323" name="Google Shape;323;p53"/>
-          <p:cNvSpPr txBox="1"/>
-          <p:nvPr>
-            <p:ph idx="1" type="body"/>
-          </p:nvPr>
-        </p:nvSpPr>
-        <p:spPr>
-          <a:xfrm>
-            <a:off x="311700" y="1152475"/>
-            <a:ext cx="8520600" cy="3729600"/>
-          </a:xfrm>
-          <a:prstGeom prst="rect">
-            <a:avLst/>
-          </a:prstGeom>
-        </p:spPr>
-        <p:txBody>
-          <a:bodyPr anchorCtr="0" anchor="t" bIns="91425" lIns="91425" spcFirstLastPara="1" rIns="91425" wrap="square" tIns="91425">
-            <a:normAutofit/>
-          </a:bodyPr>
-          <a:lstStyle/>
-          <a:p>
-            <a:pPr indent="-393700" lvl="0" marL="457200" rtl="0" algn="l">
-              <a:spcBef>
-                <a:spcPts val="0"/>
-              </a:spcBef>
-              <a:spcAft>
-                <a:spcPts val="0"/>
-              </a:spcAft>
-              <a:buSzPts val="2600"/>
-              <a:buAutoNum type="arabicPeriod"/>
-            </a:pPr>
-            <a:r>
-              <a:rPr lang="en" sz="2600"/>
-              <a:t>Translate your use cases into </a:t>
-            </a:r>
-            <a:r>
-              <a:rPr lang="en" sz="2600" u="sng"/>
-              <a:t>components</a:t>
-            </a:r>
-            <a:endParaRPr sz="2600" u="sng"/>
-          </a:p>
-          <a:p>
-            <a:pPr indent="-393700" lvl="0" marL="457200" rtl="0" algn="l">
-              <a:spcBef>
-                <a:spcPts val="0"/>
-              </a:spcBef>
-              <a:spcAft>
-                <a:spcPts val="0"/>
-              </a:spcAft>
-              <a:buSzPts val="2600"/>
-              <a:buAutoNum type="arabicPeriod"/>
-            </a:pPr>
-            <a:r>
-              <a:rPr lang="en" sz="2600"/>
-              <a:t>Create a </a:t>
-            </a:r>
-            <a:r>
-              <a:rPr lang="en" sz="2600" u="sng"/>
-              <a:t>specification</a:t>
-            </a:r>
-            <a:r>
-              <a:rPr lang="en" sz="2600"/>
-              <a:t> for each component</a:t>
-            </a:r>
-            <a:endParaRPr sz="2600"/>
-          </a:p>
-          <a:p>
-            <a:pPr indent="0" lvl="0" marL="914400" rtl="0" algn="l">
-              <a:spcBef>
-                <a:spcPts val="1200"/>
-              </a:spcBef>
-              <a:spcAft>
-                <a:spcPts val="0"/>
-              </a:spcAft>
-              <a:buNone/>
-            </a:pPr>
-            <a:r>
-              <a:rPr lang="en" sz="2200"/>
-              <a:t>Potentially including pseudocode</a:t>
-            </a:r>
-            <a:endParaRPr sz="2200"/>
-          </a:p>
-          <a:p>
-            <a:pPr indent="-393700" lvl="0" marL="457200" rtl="0" algn="l">
-              <a:spcBef>
-                <a:spcPts val="1200"/>
-              </a:spcBef>
-              <a:spcAft>
-                <a:spcPts val="0"/>
-              </a:spcAft>
-              <a:buSzPts val="2600"/>
-              <a:buAutoNum type="arabicPeriod"/>
-            </a:pPr>
-            <a:r>
-              <a:rPr lang="en" sz="2600"/>
-              <a:t>Create </a:t>
-            </a:r>
-            <a:r>
-              <a:rPr lang="en" sz="2600" u="sng"/>
-              <a:t>interaction diagrams</a:t>
-            </a:r>
-            <a:r>
-              <a:rPr lang="en" sz="2600"/>
-              <a:t> for how components interact</a:t>
-            </a:r>
-            <a:endParaRPr sz="2600"/>
-          </a:p>
-          <a:p>
-            <a:pPr indent="0" lvl="0" marL="0" rtl="0" algn="l">
-              <a:spcBef>
-                <a:spcPts val="1200"/>
-              </a:spcBef>
-              <a:spcAft>
-                <a:spcPts val="1200"/>
-              </a:spcAft>
-              <a:buNone/>
-            </a:pPr>
-            <a:r>
-              <a:rPr lang="en" sz="2400"/>
-              <a:t>Use a Markdown file in the </a:t>
-            </a:r>
-            <a:r>
-              <a:rPr lang="en" sz="2400">
-                <a:latin typeface="Courier New"/>
-                <a:ea typeface="Courier New"/>
-                <a:cs typeface="Courier New"/>
-                <a:sym typeface="Courier New"/>
-              </a:rPr>
-              <a:t>doc</a:t>
-            </a:r>
-            <a:r>
-              <a:rPr lang="en" sz="2400"/>
-              <a:t> directory </a:t>
-            </a:r>
-            <a:endParaRPr sz="2200"/>
+            <a:pPr indent="0" lvl="0" marL="0" rtl="0" algn="ctr">
+              <a:spcBef>
+                <a:spcPts val="0"/>
+              </a:spcBef>
+              <a:spcAft>
+                <a:spcPts val="0"/>
+              </a:spcAft>
+              <a:buNone/>
+            </a:pPr>
+            <a:r>
+              <a:rPr lang="en"/>
+              <a:t>From Design Onwards</a:t>
+            </a:r>
+            <a:endParaRPr/>
           </a:p>
         </p:txBody>
       </p:sp>
@@ -20353,7 +21054,7 @@
   <p:cSld>
     <p:spTree>
       <p:nvGrpSpPr>
-        <p:cNvPr id="327" name="Shape 327"/>
+        <p:cNvPr id="326" name="Shape 326"/>
         <p:cNvGrpSpPr/>
         <p:nvPr/>
       </p:nvGrpSpPr>
@@ -20367,7 +21068,7 @@
       </p:grpSpPr>
       <p:sp>
         <p:nvSpPr>
-          <p:cNvPr id="328" name="Google Shape;328;p54"/>
+          <p:cNvPr id="327" name="Google Shape;327;p54"/>
           <p:cNvSpPr txBox="1"/>
           <p:nvPr>
             <p:ph type="title"/>
@@ -20375,7 +21076,7 @@
         </p:nvSpPr>
         <p:spPr>
           <a:xfrm>
-            <a:off x="311700" y="2285400"/>
+            <a:off x="311700" y="445025"/>
             <a:ext cx="8520600" cy="572700"/>
           </a:xfrm>
           <a:prstGeom prst="rect">
@@ -20388,7 +21089,7 @@
           </a:bodyPr>
           <a:lstStyle/>
           <a:p>
-            <a:pPr indent="0" lvl="0" marL="0" rtl="0" algn="ctr">
+            <a:pPr indent="0" lvl="0" marL="0" rtl="0" algn="l">
               <a:spcBef>
                 <a:spcPts val="0"/>
               </a:spcBef>
@@ -20399,9 +21100,133 @@
             </a:pPr>
             <a:r>
               <a:rPr lang="en"/>
-              <a:t>From Design Onwards</a:t>
+              <a:t>Milestones</a:t>
             </a:r>
             <a:endParaRPr/>
+          </a:p>
+        </p:txBody>
+      </p:sp>
+      <p:sp>
+        <p:nvSpPr>
+          <p:cNvPr id="328" name="Google Shape;328;p54"/>
+          <p:cNvSpPr txBox="1"/>
+          <p:nvPr>
+            <p:ph idx="1" type="body"/>
+          </p:nvPr>
+        </p:nvSpPr>
+        <p:spPr>
+          <a:xfrm>
+            <a:off x="311700" y="1152475"/>
+            <a:ext cx="8520600" cy="3416400"/>
+          </a:xfrm>
+          <a:prstGeom prst="rect">
+            <a:avLst/>
+          </a:prstGeom>
+        </p:spPr>
+        <p:txBody>
+          <a:bodyPr anchorCtr="0" anchor="t" bIns="91425" lIns="91425" spcFirstLastPara="1" rIns="91425" wrap="square" tIns="91425">
+            <a:normAutofit/>
+          </a:bodyPr>
+          <a:lstStyle/>
+          <a:p>
+            <a:pPr indent="-381000" lvl="0" marL="457200" rtl="0" algn="l">
+              <a:spcBef>
+                <a:spcPts val="0"/>
+              </a:spcBef>
+              <a:spcAft>
+                <a:spcPts val="0"/>
+              </a:spcAft>
+              <a:buSzPts val="2400"/>
+              <a:buChar char="●"/>
+            </a:pPr>
+            <a:r>
+              <a:rPr lang="en" sz="2400"/>
+              <a:t>What are you actually going to </a:t>
+            </a:r>
+            <a:r>
+              <a:rPr i="1" lang="en" sz="2400" u="sng"/>
+              <a:t>do</a:t>
+            </a:r>
+            <a:r>
+              <a:rPr lang="en" sz="2400"/>
+              <a:t> and in what </a:t>
+            </a:r>
+            <a:r>
+              <a:rPr i="1" lang="en" sz="2400" u="sng"/>
+              <a:t>order</a:t>
+            </a:r>
+            <a:r>
+              <a:rPr lang="en" sz="2400"/>
+              <a:t>?</a:t>
+            </a:r>
+            <a:endParaRPr sz="2400"/>
+          </a:p>
+          <a:p>
+            <a:pPr indent="-381000" lvl="0" marL="457200" rtl="0" algn="l">
+              <a:spcBef>
+                <a:spcPts val="0"/>
+              </a:spcBef>
+              <a:spcAft>
+                <a:spcPts val="0"/>
+              </a:spcAft>
+              <a:buSzPts val="2400"/>
+              <a:buChar char="●"/>
+            </a:pPr>
+            <a:r>
+              <a:rPr lang="en" sz="2400"/>
+              <a:t>Are there any </a:t>
+            </a:r>
+            <a:r>
+              <a:rPr i="1" lang="en" sz="2400" u="sng"/>
+              <a:t>dependencies</a:t>
+            </a:r>
+            <a:r>
+              <a:rPr lang="en" sz="2400"/>
+              <a:t> between components such that you must build Component A before Component B?</a:t>
+            </a:r>
+            <a:endParaRPr sz="2400"/>
+          </a:p>
+          <a:p>
+            <a:pPr indent="-381000" lvl="0" marL="457200" rtl="0" algn="l">
+              <a:spcBef>
+                <a:spcPts val="0"/>
+              </a:spcBef>
+              <a:spcAft>
+                <a:spcPts val="0"/>
+              </a:spcAft>
+              <a:buSzPts val="2400"/>
+              <a:buChar char="●"/>
+            </a:pPr>
+            <a:r>
+              <a:rPr lang="en" sz="2400"/>
+              <a:t>What will success look like?</a:t>
+            </a:r>
+            <a:endParaRPr sz="2400"/>
+          </a:p>
+          <a:p>
+            <a:pPr indent="-381000" lvl="0" marL="457200" rtl="0" algn="l">
+              <a:spcBef>
+                <a:spcPts val="0"/>
+              </a:spcBef>
+              <a:spcAft>
+                <a:spcPts val="0"/>
+              </a:spcAft>
+              <a:buSzPts val="2400"/>
+              <a:buChar char="●"/>
+            </a:pPr>
+            <a:r>
+              <a:rPr lang="en" sz="2400"/>
+              <a:t>This is not specific tasks - these are </a:t>
+            </a:r>
+            <a:r>
+              <a:rPr lang="en" sz="2400"/>
+              <a:t>broad</a:t>
+            </a:r>
+            <a:r>
+              <a:rPr lang="en" sz="2400"/>
+              <a:t> strokes</a:t>
+            </a:r>
+            <a:endParaRPr sz="2400"/>
           </a:p>
         </p:txBody>
       </p:sp>
@@ -20410,6 +21235,280 @@
   <p:clrMapOvr>
     <a:masterClrMapping/>
   </p:clrMapOvr>
+  <p:timing>
+    <p:tnLst>
+      <p:par>
+        <p:cTn dur="indefinite" nodeType="tmRoot" restart="never">
+          <p:childTnLst>
+            <p:seq concurrent="1" nextAc="seek">
+              <p:cTn dur="indefinite" id="2" nodeType="mainSeq">
+                <p:childTnLst>
+                  <p:par>
+                    <p:cTn fill="hold">
+                      <p:stCondLst>
+                        <p:cond delay="indefinite"/>
+                      </p:stCondLst>
+                      <p:childTnLst>
+                        <p:par>
+                          <p:cTn fill="hold">
+                            <p:stCondLst>
+                              <p:cond delay="0"/>
+                            </p:stCondLst>
+                            <p:childTnLst>
+                              <p:par>
+                                <p:cTn fill="hold" nodeType="clickEffect" presetClass="entr" presetID="10" presetSubtype="0">
+                                  <p:stCondLst>
+                                    <p:cond delay="0"/>
+                                  </p:stCondLst>
+                                  <p:childTnLst>
+                                    <p:set>
+                                      <p:cBhvr>
+                                        <p:cTn dur="1" fill="hold">
+                                          <p:stCondLst>
+                                            <p:cond delay="0"/>
+                                          </p:stCondLst>
+                                        </p:cTn>
+                                        <p:tgtEl>
+                                          <p:spTgt spid="328">
+                                            <p:txEl>
+                                              <p:pRg end="0" st="0"/>
+                                            </p:txEl>
+                                          </p:spTgt>
+                                        </p:tgtEl>
+                                        <p:attrNameLst>
+                                          <p:attrName>style.visibility</p:attrName>
+                                        </p:attrNameLst>
+                                      </p:cBhvr>
+                                      <p:to>
+                                        <p:strVal val="visible"/>
+                                      </p:to>
+                                    </p:set>
+                                    <p:animEffect filter="fade" transition="in">
+                                      <p:cBhvr>
+                                        <p:cTn dur="1"/>
+                                        <p:tgtEl>
+                                          <p:spTgt spid="328">
+                                            <p:txEl>
+                                              <p:pRg end="0" st="0"/>
+                                            </p:txEl>
+                                          </p:spTgt>
+                                        </p:tgtEl>
+                                      </p:cBhvr>
+                                    </p:animEffect>
+                                  </p:childTnLst>
+                                </p:cTn>
+                              </p:par>
+                            </p:childTnLst>
+                          </p:cTn>
+                        </p:par>
+                      </p:childTnLst>
+                    </p:cTn>
+                  </p:par>
+                  <p:par>
+                    <p:cTn fill="hold">
+                      <p:stCondLst>
+                        <p:cond delay="indefinite"/>
+                      </p:stCondLst>
+                      <p:childTnLst>
+                        <p:par>
+                          <p:cTn fill="hold">
+                            <p:stCondLst>
+                              <p:cond delay="0"/>
+                            </p:stCondLst>
+                            <p:childTnLst>
+                              <p:par>
+                                <p:cTn fill="hold" nodeType="clickEffect" presetClass="entr" presetID="10" presetSubtype="0">
+                                  <p:stCondLst>
+                                    <p:cond delay="0"/>
+                                  </p:stCondLst>
+                                  <p:childTnLst>
+                                    <p:set>
+                                      <p:cBhvr>
+                                        <p:cTn dur="1" fill="hold">
+                                          <p:stCondLst>
+                                            <p:cond delay="0"/>
+                                          </p:stCondLst>
+                                        </p:cTn>
+                                        <p:tgtEl>
+                                          <p:spTgt spid="328">
+                                            <p:txEl>
+                                              <p:pRg end="1" st="1"/>
+                                            </p:txEl>
+                                          </p:spTgt>
+                                        </p:tgtEl>
+                                        <p:attrNameLst>
+                                          <p:attrName>style.visibility</p:attrName>
+                                        </p:attrNameLst>
+                                      </p:cBhvr>
+                                      <p:to>
+                                        <p:strVal val="visible"/>
+                                      </p:to>
+                                    </p:set>
+                                    <p:animEffect filter="fade" transition="in">
+                                      <p:cBhvr>
+                                        <p:cTn dur="1"/>
+                                        <p:tgtEl>
+                                          <p:spTgt spid="328">
+                                            <p:txEl>
+                                              <p:pRg end="1" st="1"/>
+                                            </p:txEl>
+                                          </p:spTgt>
+                                        </p:tgtEl>
+                                      </p:cBhvr>
+                                    </p:animEffect>
+                                  </p:childTnLst>
+                                </p:cTn>
+                              </p:par>
+                            </p:childTnLst>
+                          </p:cTn>
+                        </p:par>
+                      </p:childTnLst>
+                    </p:cTn>
+                  </p:par>
+                  <p:par>
+                    <p:cTn fill="hold">
+                      <p:stCondLst>
+                        <p:cond delay="indefinite"/>
+                      </p:stCondLst>
+                      <p:childTnLst>
+                        <p:par>
+                          <p:cTn fill="hold">
+                            <p:stCondLst>
+                              <p:cond delay="0"/>
+                            </p:stCondLst>
+                            <p:childTnLst>
+                              <p:par>
+                                <p:cTn fill="hold" nodeType="clickEffect" presetClass="entr" presetID="10" presetSubtype="0">
+                                  <p:stCondLst>
+                                    <p:cond delay="0"/>
+                                  </p:stCondLst>
+                                  <p:childTnLst>
+                                    <p:set>
+                                      <p:cBhvr>
+                                        <p:cTn dur="1" fill="hold">
+                                          <p:stCondLst>
+                                            <p:cond delay="0"/>
+                                          </p:stCondLst>
+                                        </p:cTn>
+                                        <p:tgtEl>
+                                          <p:spTgt spid="328">
+                                            <p:txEl>
+                                              <p:pRg end="2" st="2"/>
+                                            </p:txEl>
+                                          </p:spTgt>
+                                        </p:tgtEl>
+                                        <p:attrNameLst>
+                                          <p:attrName>style.visibility</p:attrName>
+                                        </p:attrNameLst>
+                                      </p:cBhvr>
+                                      <p:to>
+                                        <p:strVal val="visible"/>
+                                      </p:to>
+                                    </p:set>
+                                    <p:animEffect filter="fade" transition="in">
+                                      <p:cBhvr>
+                                        <p:cTn dur="1"/>
+                                        <p:tgtEl>
+                                          <p:spTgt spid="328">
+                                            <p:txEl>
+                                              <p:pRg end="2" st="2"/>
+                                            </p:txEl>
+                                          </p:spTgt>
+                                        </p:tgtEl>
+                                      </p:cBhvr>
+                                    </p:animEffect>
+                                  </p:childTnLst>
+                                </p:cTn>
+                              </p:par>
+                            </p:childTnLst>
+                          </p:cTn>
+                        </p:par>
+                      </p:childTnLst>
+                    </p:cTn>
+                  </p:par>
+                  <p:par>
+                    <p:cTn fill="hold">
+                      <p:stCondLst>
+                        <p:cond delay="indefinite"/>
+                      </p:stCondLst>
+                      <p:childTnLst>
+                        <p:par>
+                          <p:cTn fill="hold">
+                            <p:stCondLst>
+                              <p:cond delay="0"/>
+                            </p:stCondLst>
+                            <p:childTnLst>
+                              <p:par>
+                                <p:cTn fill="hold" nodeType="clickEffect" presetClass="entr" presetID="10" presetSubtype="0">
+                                  <p:stCondLst>
+                                    <p:cond delay="0"/>
+                                  </p:stCondLst>
+                                  <p:childTnLst>
+                                    <p:set>
+                                      <p:cBhvr>
+                                        <p:cTn dur="1" fill="hold">
+                                          <p:stCondLst>
+                                            <p:cond delay="0"/>
+                                          </p:stCondLst>
+                                        </p:cTn>
+                                        <p:tgtEl>
+                                          <p:spTgt spid="328">
+                                            <p:txEl>
+                                              <p:pRg end="3" st="3"/>
+                                            </p:txEl>
+                                          </p:spTgt>
+                                        </p:tgtEl>
+                                        <p:attrNameLst>
+                                          <p:attrName>style.visibility</p:attrName>
+                                        </p:attrNameLst>
+                                      </p:cBhvr>
+                                      <p:to>
+                                        <p:strVal val="visible"/>
+                                      </p:to>
+                                    </p:set>
+                                    <p:animEffect filter="fade" transition="in">
+                                      <p:cBhvr>
+                                        <p:cTn dur="1"/>
+                                        <p:tgtEl>
+                                          <p:spTgt spid="328">
+                                            <p:txEl>
+                                              <p:pRg end="3" st="3"/>
+                                            </p:txEl>
+                                          </p:spTgt>
+                                        </p:tgtEl>
+                                      </p:cBhvr>
+                                    </p:animEffect>
+                                  </p:childTnLst>
+                                </p:cTn>
+                              </p:par>
+                            </p:childTnLst>
+                          </p:cTn>
+                        </p:par>
+                      </p:childTnLst>
+                    </p:cTn>
+                  </p:par>
+                </p:childTnLst>
+              </p:cTn>
+              <p:prevCondLst>
+                <p:cond evt="onPrev">
+                  <p:tgtEl>
+                    <p:sldTgt/>
+                  </p:tgtEl>
+                </p:cond>
+              </p:prevCondLst>
+              <p:nextCondLst>
+                <p:cond evt="onNext">
+                  <p:tgtEl>
+                    <p:sldTgt/>
+                  </p:tgtEl>
+                </p:cond>
+              </p:nextCondLst>
+            </p:seq>
+          </p:childTnLst>
+        </p:cTn>
+      </p:par>
+    </p:tnLst>
+  </p:timing>
 </p:sld>
 </file>
 
@@ -20464,7 +21563,7 @@
             </a:pPr>
             <a:r>
               <a:rPr lang="en"/>
-              <a:t>Milestones</a:t>
+              <a:t>Example: ATM milestones</a:t>
             </a:r>
             <a:endParaRPr/>
           </a:p>
@@ -20481,7 +21580,7 @@
         <p:spPr>
           <a:xfrm>
             <a:off x="311700" y="1152475"/>
-            <a:ext cx="8520600" cy="3416400"/>
+            <a:ext cx="8520600" cy="3732000"/>
           </a:xfrm>
           <a:prstGeom prst="rect">
             <a:avLst/>
@@ -20489,108 +21588,132 @@
         </p:spPr>
         <p:txBody>
           <a:bodyPr anchorCtr="0" anchor="t" bIns="91425" lIns="91425" spcFirstLastPara="1" rIns="91425" wrap="square" tIns="91425">
-            <a:normAutofit/>
+            <a:noAutofit/>
           </a:bodyPr>
           <a:lstStyle/>
           <a:p>
-            <a:pPr indent="-381000" lvl="0" marL="457200" rtl="0" algn="l">
-              <a:spcBef>
-                <a:spcPts val="0"/>
-              </a:spcBef>
-              <a:spcAft>
-                <a:spcPts val="0"/>
-              </a:spcAft>
-              <a:buSzPts val="2400"/>
-              <a:buChar char="●"/>
-            </a:pPr>
-            <a:r>
-              <a:rPr lang="en" sz="2400"/>
-              <a:t>What are you actually going to </a:t>
-            </a:r>
-            <a:r>
-              <a:rPr i="1" lang="en" sz="2400" u="sng"/>
-              <a:t>do</a:t>
-            </a:r>
-            <a:r>
-              <a:rPr lang="en" sz="2400"/>
-              <a:t> and in what </a:t>
-            </a:r>
-            <a:r>
-              <a:rPr i="1" lang="en" sz="2400" u="sng"/>
-              <a:t>order</a:t>
-            </a:r>
-            <a:r>
-              <a:rPr lang="en" sz="2400"/>
-              <a:t>?</a:t>
-            </a:r>
-            <a:endParaRPr sz="2400"/>
-          </a:p>
-          <a:p>
-            <a:pPr indent="-381000" lvl="0" marL="457200" rtl="0" algn="l">
-              <a:spcBef>
-                <a:spcPts val="0"/>
-              </a:spcBef>
-              <a:spcAft>
-                <a:spcPts val="0"/>
-              </a:spcAft>
-              <a:buSzPts val="2400"/>
-              <a:buChar char="●"/>
-            </a:pPr>
-            <a:r>
-              <a:rPr lang="en" sz="2400"/>
-              <a:t>Are there any </a:t>
-            </a:r>
-            <a:r>
-              <a:rPr i="1" lang="en" sz="2400" u="sng"/>
-              <a:t>dependencies</a:t>
-            </a:r>
-            <a:r>
-              <a:rPr lang="en" sz="2400"/>
-              <a:t> between components such that you must build Component A before Component B?</a:t>
-            </a:r>
-            <a:endParaRPr sz="2400"/>
-          </a:p>
-          <a:p>
-            <a:pPr indent="-381000" lvl="0" marL="457200" rtl="0" algn="l">
-              <a:spcBef>
-                <a:spcPts val="0"/>
-              </a:spcBef>
-              <a:spcAft>
-                <a:spcPts val="0"/>
-              </a:spcAft>
-              <a:buSzPts val="2400"/>
-              <a:buChar char="●"/>
-            </a:pPr>
-            <a:r>
-              <a:rPr lang="en" sz="2400"/>
-              <a:t>What will success look like?</a:t>
-            </a:r>
-            <a:endParaRPr sz="2400"/>
-          </a:p>
-          <a:p>
-            <a:pPr indent="-381000" lvl="0" marL="457200" rtl="0" algn="l">
-              <a:spcBef>
-                <a:spcPts val="0"/>
-              </a:spcBef>
-              <a:spcAft>
-                <a:spcPts val="0"/>
-              </a:spcAft>
-              <a:buSzPts val="2400"/>
-              <a:buChar char="●"/>
-            </a:pPr>
-            <a:r>
-              <a:rPr lang="en" sz="2400"/>
-              <a:t>This is not specific tasks - these are </a:t>
-            </a:r>
-            <a:r>
-              <a:rPr lang="en" sz="2400"/>
-              <a:t>broad</a:t>
-            </a:r>
-            <a:r>
-              <a:rPr lang="en" sz="2400"/>
-              <a:t> strokes</a:t>
-            </a:r>
-            <a:endParaRPr sz="2400"/>
+            <a:pPr indent="-349250" lvl="0" marL="457200" rtl="0" algn="l">
+              <a:spcBef>
+                <a:spcPts val="0"/>
+              </a:spcBef>
+              <a:spcAft>
+                <a:spcPts val="0"/>
+              </a:spcAft>
+              <a:buSzPts val="1900"/>
+              <a:buAutoNum type="arabicPeriod"/>
+            </a:pPr>
+            <a:r>
+              <a:rPr b="1" lang="en" sz="1900"/>
+              <a:t>Build account infrastructure</a:t>
+            </a:r>
+            <a:br>
+              <a:rPr lang="en" sz="1900"/>
+            </a:br>
+            <a:r>
+              <a:rPr b="1" lang="en" sz="1900"/>
+              <a:t>Success</a:t>
+            </a:r>
+            <a:r>
+              <a:rPr b="1" lang="en" sz="1900"/>
+              <a:t>:</a:t>
+            </a:r>
+            <a:r>
+              <a:rPr lang="en" sz="1900"/>
+              <a:t> account database and middle control layer exist that can access an account</a:t>
+            </a:r>
+            <a:endParaRPr sz="1900"/>
+          </a:p>
+          <a:p>
+            <a:pPr indent="-349250" lvl="0" marL="457200" rtl="0" algn="l">
+              <a:spcBef>
+                <a:spcPts val="0"/>
+              </a:spcBef>
+              <a:spcAft>
+                <a:spcPts val="0"/>
+              </a:spcAft>
+              <a:buSzPts val="1900"/>
+              <a:buAutoNum type="arabicPeriod"/>
+            </a:pPr>
+            <a:r>
+              <a:rPr b="1" lang="en" sz="1900"/>
+              <a:t>Build user authentication flow</a:t>
+            </a:r>
+            <a:br>
+              <a:rPr b="1" lang="en" sz="1900"/>
+            </a:br>
+            <a:r>
+              <a:rPr b="1" lang="en" sz="1900"/>
+              <a:t>Success:</a:t>
+            </a:r>
+            <a:r>
+              <a:rPr lang="en" sz="1900"/>
+              <a:t> manually authenticate a user with a PIN by calling the Python functions directly</a:t>
+            </a:r>
+            <a:endParaRPr sz="1900"/>
+          </a:p>
+          <a:p>
+            <a:pPr indent="-349250" lvl="0" marL="457200" rtl="0" algn="l">
+              <a:spcBef>
+                <a:spcPts val="0"/>
+              </a:spcBef>
+              <a:spcAft>
+                <a:spcPts val="0"/>
+              </a:spcAft>
+              <a:buSzPts val="1900"/>
+              <a:buAutoNum type="arabicPeriod"/>
+            </a:pPr>
+            <a:r>
+              <a:rPr b="1" lang="en" sz="1900"/>
+              <a:t>Build user interface</a:t>
+            </a:r>
+            <a:br>
+              <a:rPr b="1" lang="en" sz="1900"/>
+            </a:br>
+            <a:r>
+              <a:rPr b="1" lang="en" sz="1900"/>
+              <a:t>Success:</a:t>
+            </a:r>
+            <a:r>
+              <a:rPr lang="en" sz="1900"/>
+              <a:t> user can log onto their account with their </a:t>
+            </a:r>
+            <a:r>
+              <a:rPr lang="en" sz="1900"/>
+              <a:t>account</a:t>
+            </a:r>
+            <a:r>
+              <a:rPr lang="en" sz="1900"/>
+              <a:t> no. and PIN</a:t>
+            </a:r>
+            <a:endParaRPr sz="1900"/>
+          </a:p>
+          <a:p>
+            <a:pPr indent="-349250" lvl="0" marL="457200" rtl="0" algn="l">
+              <a:spcBef>
+                <a:spcPts val="0"/>
+              </a:spcBef>
+              <a:spcAft>
+                <a:spcPts val="0"/>
+              </a:spcAft>
+              <a:buSzPts val="1900"/>
+              <a:buAutoNum type="arabicPeriod"/>
+            </a:pPr>
+            <a:r>
+              <a:rPr b="1" lang="en" sz="1900"/>
+              <a:t>Build account withdrawal/deposit features</a:t>
+            </a:r>
+            <a:br>
+              <a:rPr b="1" lang="en" sz="1900"/>
+            </a:br>
+            <a:r>
+              <a:rPr b="1" lang="en" sz="1900"/>
+              <a:t>Success:</a:t>
+            </a:r>
+            <a:r>
+              <a:rPr lang="en" sz="1900"/>
+              <a:t> user can fully access funds in their account</a:t>
+            </a:r>
+            <a:endParaRPr sz="1900"/>
           </a:p>
         </p:txBody>
       </p:sp>
@@ -20927,7 +22050,7 @@
             </a:pPr>
             <a:r>
               <a:rPr lang="en"/>
-              <a:t>Example: ATM milestones</a:t>
+              <a:t>Breaking down a milestone</a:t>
             </a:r>
             <a:endParaRPr/>
           </a:p>
@@ -20944,7 +22067,7 @@
         <p:spPr>
           <a:xfrm>
             <a:off x="311700" y="1152475"/>
-            <a:ext cx="8520600" cy="3732000"/>
+            <a:ext cx="8520600" cy="3416400"/>
           </a:xfrm>
           <a:prstGeom prst="rect">
             <a:avLst/>
@@ -20952,132 +22075,107 @@
         </p:spPr>
         <p:txBody>
           <a:bodyPr anchorCtr="0" anchor="t" bIns="91425" lIns="91425" spcFirstLastPara="1" rIns="91425" wrap="square" tIns="91425">
-            <a:noAutofit/>
+            <a:normAutofit/>
           </a:bodyPr>
           <a:lstStyle/>
           <a:p>
-            <a:pPr indent="-349250" lvl="0" marL="457200" rtl="0" algn="l">
-              <a:spcBef>
-                <a:spcPts val="0"/>
-              </a:spcBef>
-              <a:spcAft>
-                <a:spcPts val="0"/>
-              </a:spcAft>
-              <a:buSzPts val="1900"/>
-              <a:buAutoNum type="arabicPeriod"/>
-            </a:pPr>
-            <a:r>
-              <a:rPr b="1" lang="en" sz="1900"/>
-              <a:t>Build account infrastructure</a:t>
-            </a:r>
-            <a:br>
-              <a:rPr lang="en" sz="1900"/>
-            </a:br>
-            <a:r>
-              <a:rPr b="1" lang="en" sz="1900"/>
-              <a:t>Success</a:t>
-            </a:r>
-            <a:r>
-              <a:rPr b="1" lang="en" sz="1900"/>
+            <a:pPr indent="0" lvl="0" marL="0" rtl="0" algn="l">
+              <a:spcBef>
+                <a:spcPts val="0"/>
+              </a:spcBef>
+              <a:spcAft>
+                <a:spcPts val="0"/>
+              </a:spcAft>
+              <a:buNone/>
+            </a:pPr>
+            <a:r>
+              <a:rPr lang="en" sz="2200"/>
+              <a:t>Once you have </a:t>
+            </a:r>
+            <a:r>
+              <a:rPr lang="en" sz="2200" u="sng"/>
+              <a:t>milestones</a:t>
+            </a:r>
+            <a:r>
+              <a:rPr lang="en" sz="2200"/>
+              <a:t>, you need to break them down into </a:t>
+            </a:r>
+            <a:r>
+              <a:rPr lang="en" sz="2200" u="sng"/>
+              <a:t>tasks</a:t>
+            </a:r>
+            <a:r>
+              <a:rPr lang="en" sz="2200"/>
               <a:t>:</a:t>
             </a:r>
-            <a:r>
-              <a:rPr lang="en" sz="1900"/>
-              <a:t> account database and middle control layer exist that can access an account</a:t>
-            </a:r>
-            <a:endParaRPr sz="1900"/>
-          </a:p>
-          <a:p>
-            <a:pPr indent="-349250" lvl="0" marL="457200" rtl="0" algn="l">
-              <a:spcBef>
-                <a:spcPts val="0"/>
-              </a:spcBef>
-              <a:spcAft>
-                <a:spcPts val="0"/>
-              </a:spcAft>
-              <a:buSzPts val="1900"/>
-              <a:buAutoNum type="arabicPeriod"/>
-            </a:pPr>
-            <a:r>
-              <a:rPr b="1" lang="en" sz="1900"/>
-              <a:t>Build user authentication flow</a:t>
-            </a:r>
-            <a:br>
-              <a:rPr b="1" lang="en" sz="1900"/>
-            </a:br>
-            <a:r>
-              <a:rPr b="1" lang="en" sz="1900"/>
-              <a:t>Success:</a:t>
-            </a:r>
-            <a:r>
-              <a:rPr lang="en" sz="1900"/>
-              <a:t> manually authenticate a user with a PIN by calling the Python functions directly</a:t>
-            </a:r>
-            <a:endParaRPr sz="1900"/>
-          </a:p>
-          <a:p>
-            <a:pPr indent="-349250" lvl="0" marL="457200" rtl="0" algn="l">
-              <a:spcBef>
-                <a:spcPts val="0"/>
-              </a:spcBef>
-              <a:spcAft>
-                <a:spcPts val="0"/>
-              </a:spcAft>
-              <a:buSzPts val="1900"/>
-              <a:buAutoNum type="arabicPeriod"/>
-            </a:pPr>
-            <a:r>
-              <a:rPr b="1" lang="en" sz="1900"/>
-              <a:t>Build user interface</a:t>
-            </a:r>
-            <a:br>
-              <a:rPr b="1" lang="en" sz="1900"/>
-            </a:br>
-            <a:r>
-              <a:rPr b="1" lang="en" sz="1900"/>
-              <a:t>Success:</a:t>
-            </a:r>
-            <a:r>
-              <a:rPr lang="en" sz="1900"/>
-              <a:t> user can log onto their account with their </a:t>
-            </a:r>
-            <a:r>
-              <a:rPr lang="en" sz="1900"/>
-              <a:t>account</a:t>
-            </a:r>
-            <a:r>
-              <a:rPr lang="en" sz="1900"/>
-              <a:t> no. and PIN</a:t>
-            </a:r>
-            <a:endParaRPr sz="1900"/>
-          </a:p>
-          <a:p>
-            <a:pPr indent="-349250" lvl="0" marL="457200" rtl="0" algn="l">
-              <a:spcBef>
-                <a:spcPts val="0"/>
-              </a:spcBef>
-              <a:spcAft>
-                <a:spcPts val="0"/>
-              </a:spcAft>
-              <a:buSzPts val="1900"/>
-              <a:buAutoNum type="arabicPeriod"/>
-            </a:pPr>
-            <a:r>
-              <a:rPr b="1" lang="en" sz="1900"/>
-              <a:t>Build account withdrawal/deposit features</a:t>
-            </a:r>
-            <a:br>
-              <a:rPr b="1" lang="en" sz="1900"/>
-            </a:br>
-            <a:r>
-              <a:rPr b="1" lang="en" sz="1900"/>
-              <a:t>Success:</a:t>
-            </a:r>
-            <a:r>
-              <a:rPr lang="en" sz="1900"/>
-              <a:t> user can fully access funds in their account</a:t>
-            </a:r>
-            <a:endParaRPr sz="1900"/>
+            <a:endParaRPr sz="2200"/>
+          </a:p>
+          <a:p>
+            <a:pPr indent="-368300" lvl="0" marL="457200" rtl="0" algn="l">
+              <a:spcBef>
+                <a:spcPts val="1200"/>
+              </a:spcBef>
+              <a:spcAft>
+                <a:spcPts val="0"/>
+              </a:spcAft>
+              <a:buSzPts val="2200"/>
+              <a:buChar char="●"/>
+            </a:pPr>
+            <a:r>
+              <a:rPr lang="en" sz="2200"/>
+              <a:t>Which components do you need to implement?</a:t>
+            </a:r>
+            <a:endParaRPr sz="2200"/>
+          </a:p>
+          <a:p>
+            <a:pPr indent="-368300" lvl="0" marL="457200" rtl="0" algn="l">
+              <a:spcBef>
+                <a:spcPts val="0"/>
+              </a:spcBef>
+              <a:spcAft>
+                <a:spcPts val="0"/>
+              </a:spcAft>
+              <a:buSzPts val="2200"/>
+              <a:buChar char="●"/>
+            </a:pPr>
+            <a:r>
+              <a:rPr lang="en" sz="2200"/>
+              <a:t>What packages do you need to incorporate?</a:t>
+            </a:r>
+            <a:endParaRPr sz="2200"/>
+          </a:p>
+          <a:p>
+            <a:pPr indent="-368300" lvl="0" marL="457200" rtl="0" algn="l">
+              <a:spcBef>
+                <a:spcPts val="0"/>
+              </a:spcBef>
+              <a:spcAft>
+                <a:spcPts val="0"/>
+              </a:spcAft>
+              <a:buSzPts val="2200"/>
+              <a:buChar char="●"/>
+            </a:pPr>
+            <a:r>
+              <a:rPr lang="en" sz="2200"/>
+              <a:t>What tests or validation do you need to do?</a:t>
+            </a:r>
+            <a:endParaRPr sz="2200"/>
+          </a:p>
+          <a:p>
+            <a:pPr indent="0" lvl="0" marL="0" rtl="0" algn="l">
+              <a:spcBef>
+                <a:spcPts val="1200"/>
+              </a:spcBef>
+              <a:spcAft>
+                <a:spcPts val="1200"/>
+              </a:spcAft>
+              <a:buNone/>
+            </a:pPr>
+            <a:r>
+              <a:rPr lang="en" sz="2200"/>
+              <a:t>Suggestion: use GitHub Issues!</a:t>
+            </a:r>
+            <a:endParaRPr sz="2200"/>
           </a:p>
         </p:txBody>
       </p:sp>
@@ -21876,7 +22974,8 @@
               <a:buNone/>
             </a:pPr>
             <a:r>
-              <a:t/>
+              <a:rPr lang="en"/>
+              <a:t>Dividing up responsibilities</a:t>
             </a:r>
             <a:endParaRPr/>
           </a:p>
@@ -21885,6 +22984,273 @@
       <p:sp>
         <p:nvSpPr>
           <p:cNvPr id="358" name="Google Shape;358;p59"/>
+          <p:cNvSpPr txBox="1"/>
+          <p:nvPr>
+            <p:ph idx="1" type="body"/>
+          </p:nvPr>
+        </p:nvSpPr>
+        <p:spPr>
+          <a:xfrm>
+            <a:off x="311700" y="1152475"/>
+            <a:ext cx="8520600" cy="3802800"/>
+          </a:xfrm>
+          <a:prstGeom prst="rect">
+            <a:avLst/>
+          </a:prstGeom>
+        </p:spPr>
+        <p:txBody>
+          <a:bodyPr anchorCtr="0" anchor="t" bIns="91425" lIns="91425" spcFirstLastPara="1" rIns="91425" wrap="square" tIns="91425">
+            <a:noAutofit/>
+          </a:bodyPr>
+          <a:lstStyle/>
+          <a:p>
+            <a:pPr indent="0" lvl="0" marL="0" rtl="0" algn="l">
+              <a:lnSpc>
+                <a:spcPct val="105000"/>
+              </a:lnSpc>
+              <a:spcBef>
+                <a:spcPts val="0"/>
+              </a:spcBef>
+              <a:spcAft>
+                <a:spcPts val="0"/>
+              </a:spcAft>
+              <a:buNone/>
+            </a:pPr>
+            <a:r>
+              <a:rPr lang="en"/>
+              <a:t>Besides actual coding work, there are other responsibilities to divvy up. Everyone is encouraged to contribute to everything as they like, but dividing up who is ultimately accountable for making sure everyone does their part of the project is helpful. Common roles:</a:t>
+            </a:r>
+            <a:endParaRPr/>
+          </a:p>
+          <a:p>
+            <a:pPr indent="-342900" lvl="0" marL="457200" rtl="0" algn="l">
+              <a:lnSpc>
+                <a:spcPct val="105000"/>
+              </a:lnSpc>
+              <a:spcBef>
+                <a:spcPts val="1200"/>
+              </a:spcBef>
+              <a:spcAft>
+                <a:spcPts val="0"/>
+              </a:spcAft>
+              <a:buSzPts val="1800"/>
+              <a:buChar char="●"/>
+            </a:pPr>
+            <a:r>
+              <a:rPr lang="en"/>
+              <a:t>Designers (system design, documents, communication)</a:t>
+            </a:r>
+            <a:endParaRPr/>
+          </a:p>
+          <a:p>
+            <a:pPr indent="-317500" lvl="1" marL="914400" rtl="0" algn="l">
+              <a:lnSpc>
+                <a:spcPct val="105000"/>
+              </a:lnSpc>
+              <a:spcBef>
+                <a:spcPts val="0"/>
+              </a:spcBef>
+              <a:spcAft>
+                <a:spcPts val="0"/>
+              </a:spcAft>
+              <a:buSzPts val="1400"/>
+              <a:buChar char="○"/>
+            </a:pPr>
+            <a:r>
+              <a:rPr lang="en"/>
+              <a:t>Keep everyone accountable for documentation, design, &amp; communication with instructors</a:t>
+            </a:r>
+            <a:endParaRPr/>
+          </a:p>
+          <a:p>
+            <a:pPr indent="-342900" lvl="0" marL="457200" rtl="0" algn="l">
+              <a:lnSpc>
+                <a:spcPct val="105000"/>
+              </a:lnSpc>
+              <a:spcBef>
+                <a:spcPts val="0"/>
+              </a:spcBef>
+              <a:spcAft>
+                <a:spcPts val="0"/>
+              </a:spcAft>
+              <a:buSzPts val="1800"/>
+              <a:buChar char="●"/>
+            </a:pPr>
+            <a:r>
+              <a:rPr lang="en"/>
+              <a:t>Developers ("devs")</a:t>
+            </a:r>
+            <a:endParaRPr/>
+          </a:p>
+          <a:p>
+            <a:pPr indent="-317500" lvl="1" marL="914400" rtl="0" algn="l">
+              <a:lnSpc>
+                <a:spcPct val="105000"/>
+              </a:lnSpc>
+              <a:spcBef>
+                <a:spcPts val="0"/>
+              </a:spcBef>
+              <a:spcAft>
+                <a:spcPts val="0"/>
+              </a:spcAft>
+              <a:buSzPts val="1400"/>
+              <a:buChar char="○"/>
+            </a:pPr>
+            <a:r>
+              <a:rPr lang="en"/>
+              <a:t>Focus on making sure everyone makes good implementation decisions</a:t>
+            </a:r>
+            <a:endParaRPr/>
+          </a:p>
+          <a:p>
+            <a:pPr indent="-342900" lvl="0" marL="457200" rtl="0" algn="l">
+              <a:lnSpc>
+                <a:spcPct val="105000"/>
+              </a:lnSpc>
+              <a:spcBef>
+                <a:spcPts val="0"/>
+              </a:spcBef>
+              <a:spcAft>
+                <a:spcPts val="0"/>
+              </a:spcAft>
+              <a:buSzPts val="1800"/>
+              <a:buChar char="●"/>
+            </a:pPr>
+            <a:r>
+              <a:rPr lang="en"/>
+              <a:t>Testers</a:t>
+            </a:r>
+            <a:endParaRPr/>
+          </a:p>
+          <a:p>
+            <a:pPr indent="-317500" lvl="1" marL="914400" rtl="0" algn="l">
+              <a:lnSpc>
+                <a:spcPct val="105000"/>
+              </a:lnSpc>
+              <a:spcBef>
+                <a:spcPts val="0"/>
+              </a:spcBef>
+              <a:spcAft>
+                <a:spcPts val="0"/>
+              </a:spcAft>
+              <a:buSzPts val="1400"/>
+              <a:buChar char="○"/>
+            </a:pPr>
+            <a:r>
+              <a:rPr lang="en"/>
+              <a:t>Ensure everyone keeps up with good code testing and style practices</a:t>
+            </a:r>
+            <a:endParaRPr/>
+          </a:p>
+          <a:p>
+            <a:pPr indent="-342900" lvl="0" marL="457200" rtl="0" algn="l">
+              <a:lnSpc>
+                <a:spcPct val="105000"/>
+              </a:lnSpc>
+              <a:spcBef>
+                <a:spcPts val="0"/>
+              </a:spcBef>
+              <a:spcAft>
+                <a:spcPts val="0"/>
+              </a:spcAft>
+              <a:buSzPts val="1800"/>
+              <a:buChar char="●"/>
+            </a:pPr>
+            <a:r>
+              <a:rPr lang="en"/>
+              <a:t>A project manager a.k.a. "PM"</a:t>
+            </a:r>
+            <a:endParaRPr/>
+          </a:p>
+          <a:p>
+            <a:pPr indent="-317500" lvl="1" marL="914400" rtl="0" algn="l">
+              <a:lnSpc>
+                <a:spcPct val="105000"/>
+              </a:lnSpc>
+              <a:spcBef>
+                <a:spcPts val="0"/>
+              </a:spcBef>
+              <a:spcAft>
+                <a:spcPts val="0"/>
+              </a:spcAft>
+              <a:buSzPts val="1400"/>
+              <a:buChar char="○"/>
+            </a:pPr>
+            <a:r>
+              <a:rPr lang="en"/>
+              <a:t>Run standups &amp; keep track of milestone progress</a:t>
+            </a:r>
+            <a:endParaRPr/>
+          </a:p>
+        </p:txBody>
+      </p:sp>
+    </p:spTree>
+  </p:cSld>
+  <p:clrMapOvr>
+    <a:masterClrMapping/>
+  </p:clrMapOvr>
+</p:sld>
+</file>
+
+<file path=ppt/slides/slide48.xml><?xml version="1.0" encoding="utf-8"?>
+<p:sld xmlns:a="http://schemas.openxmlformats.org/drawingml/2006/main" xmlns:r="http://schemas.openxmlformats.org/officeDocument/2006/relationships" xmlns:mc="http://schemas.openxmlformats.org/markup-compatibility/2006" xmlns:mv="urn:schemas-microsoft-com:mac:vml" xmlns:p="http://schemas.openxmlformats.org/presentationml/2006/main" xmlns:c="http://schemas.openxmlformats.org/drawingml/2006/chart" xmlns:dgm="http://schemas.openxmlformats.org/drawingml/2006/diagram" xmlns:o="urn:schemas-microsoft-com:office:office" xmlns:v="urn:schemas-microsoft-com:vml" xmlns:pvml="urn:schemas-microsoft-com:office:powerpoint" xmlns:com="http://schemas.openxmlformats.org/drawingml/2006/compatibility" xmlns:p14="http://schemas.microsoft.com/office/powerpoint/2010/main" xmlns:p15="http://schemas.microsoft.com/office/powerpoint/2012/main" xmlns:ahyp="http://schemas.microsoft.com/office/drawing/2018/hyperlinkcolor">
+  <p:cSld>
+    <p:spTree>
+      <p:nvGrpSpPr>
+        <p:cNvPr id="362" name="Shape 362"/>
+        <p:cNvGrpSpPr/>
+        <p:nvPr/>
+      </p:nvGrpSpPr>
+      <p:grpSpPr>
+        <a:xfrm>
+          <a:off x="0" y="0"/>
+          <a:ext cx="0" cy="0"/>
+          <a:chOff x="0" y="0"/>
+          <a:chExt cx="0" cy="0"/>
+        </a:xfrm>
+      </p:grpSpPr>
+      <p:sp>
+        <p:nvSpPr>
+          <p:cNvPr id="363" name="Google Shape;363;p60"/>
+          <p:cNvSpPr txBox="1"/>
+          <p:nvPr>
+            <p:ph type="title"/>
+          </p:nvPr>
+        </p:nvSpPr>
+        <p:spPr>
+          <a:xfrm>
+            <a:off x="311700" y="445025"/>
+            <a:ext cx="8520600" cy="572700"/>
+          </a:xfrm>
+          <a:prstGeom prst="rect">
+            <a:avLst/>
+          </a:prstGeom>
+        </p:spPr>
+        <p:txBody>
+          <a:bodyPr anchorCtr="0" anchor="t" bIns="91425" lIns="91425" spcFirstLastPara="1" rIns="91425" wrap="square" tIns="91425">
+            <a:normAutofit fontScale="90000"/>
+          </a:bodyPr>
+          <a:lstStyle/>
+          <a:p>
+            <a:pPr indent="0" lvl="0" marL="0" rtl="0" algn="l">
+              <a:spcBef>
+                <a:spcPts val="0"/>
+              </a:spcBef>
+              <a:spcAft>
+                <a:spcPts val="0"/>
+              </a:spcAft>
+              <a:buNone/>
+            </a:pPr>
+            <a:r>
+              <a:t/>
+            </a:r>
+            <a:endParaRPr/>
+          </a:p>
+        </p:txBody>
+      </p:sp>
+      <p:sp>
+        <p:nvSpPr>
+          <p:cNvPr id="364" name="Google Shape;364;p60"/>
           <p:cNvSpPr txBox="1"/>
           <p:nvPr>
             <p:ph idx="1" type="body"/>
@@ -21928,6 +23294,228 @@
               <a:t>https://uwdata515.github.io/projects.html</a:t>
             </a:r>
             <a:endParaRPr/>
+          </a:p>
+        </p:txBody>
+      </p:sp>
+    </p:spTree>
+  </p:cSld>
+  <p:clrMapOvr>
+    <a:masterClrMapping/>
+  </p:clrMapOvr>
+</p:sld>
+</file>
+
+<file path=ppt/slides/slide49.xml><?xml version="1.0" encoding="utf-8"?>
+<p:sld xmlns:a="http://schemas.openxmlformats.org/drawingml/2006/main" xmlns:r="http://schemas.openxmlformats.org/officeDocument/2006/relationships" xmlns:mc="http://schemas.openxmlformats.org/markup-compatibility/2006" xmlns:mv="urn:schemas-microsoft-com:mac:vml" xmlns:p="http://schemas.openxmlformats.org/presentationml/2006/main" xmlns:c="http://schemas.openxmlformats.org/drawingml/2006/chart" xmlns:dgm="http://schemas.openxmlformats.org/drawingml/2006/diagram" xmlns:o="urn:schemas-microsoft-com:office:office" xmlns:v="urn:schemas-microsoft-com:vml" xmlns:pvml="urn:schemas-microsoft-com:office:powerpoint" xmlns:com="http://schemas.openxmlformats.org/drawingml/2006/compatibility" xmlns:p14="http://schemas.microsoft.com/office/powerpoint/2010/main" xmlns:p15="http://schemas.microsoft.com/office/powerpoint/2012/main" xmlns:ahyp="http://schemas.microsoft.com/office/drawing/2018/hyperlinkcolor">
+  <p:cSld>
+    <p:spTree>
+      <p:nvGrpSpPr>
+        <p:cNvPr id="368" name="Shape 368"/>
+        <p:cNvGrpSpPr/>
+        <p:nvPr/>
+      </p:nvGrpSpPr>
+      <p:grpSpPr>
+        <a:xfrm>
+          <a:off x="0" y="0"/>
+          <a:ext cx="0" cy="0"/>
+          <a:chOff x="0" y="0"/>
+          <a:chExt cx="0" cy="0"/>
+        </a:xfrm>
+      </p:grpSpPr>
+      <p:sp>
+        <p:nvSpPr>
+          <p:cNvPr id="369" name="Google Shape;369;p61"/>
+          <p:cNvSpPr txBox="1"/>
+          <p:nvPr>
+            <p:ph type="title"/>
+          </p:nvPr>
+        </p:nvSpPr>
+        <p:spPr>
+          <a:xfrm>
+            <a:off x="311700" y="445025"/>
+            <a:ext cx="8520600" cy="572700"/>
+          </a:xfrm>
+          <a:prstGeom prst="rect">
+            <a:avLst/>
+          </a:prstGeom>
+        </p:spPr>
+        <p:txBody>
+          <a:bodyPr anchorCtr="0" anchor="t" bIns="91425" lIns="91425" spcFirstLastPara="1" rIns="91425" wrap="square" tIns="91425">
+            <a:noAutofit/>
+          </a:bodyPr>
+          <a:lstStyle/>
+          <a:p>
+            <a:pPr indent="0" lvl="0" marL="0" rtl="0" algn="l">
+              <a:spcBef>
+                <a:spcPts val="0"/>
+              </a:spcBef>
+              <a:spcAft>
+                <a:spcPts val="0"/>
+              </a:spcAft>
+              <a:buSzPts val="990"/>
+              <a:buNone/>
+            </a:pPr>
+            <a:r>
+              <a:rPr lang="en" sz="2620"/>
+              <a:t>Exercise: Your Components</a:t>
+            </a:r>
+            <a:endParaRPr sz="2620"/>
+          </a:p>
+        </p:txBody>
+      </p:sp>
+      <p:sp>
+        <p:nvSpPr>
+          <p:cNvPr id="370" name="Google Shape;370;p61"/>
+          <p:cNvSpPr txBox="1"/>
+          <p:nvPr>
+            <p:ph idx="1" type="body"/>
+          </p:nvPr>
+        </p:nvSpPr>
+        <p:spPr>
+          <a:xfrm>
+            <a:off x="311700" y="1152475"/>
+            <a:ext cx="8520600" cy="3729600"/>
+          </a:xfrm>
+          <a:prstGeom prst="rect">
+            <a:avLst/>
+          </a:prstGeom>
+        </p:spPr>
+        <p:txBody>
+          <a:bodyPr anchorCtr="0" anchor="t" bIns="91425" lIns="91425" spcFirstLastPara="1" rIns="91425" wrap="square" tIns="91425">
+            <a:normAutofit lnSpcReduction="10000"/>
+          </a:bodyPr>
+          <a:lstStyle/>
+          <a:p>
+            <a:pPr indent="-393700" lvl="0" marL="457200" rtl="0" algn="l">
+              <a:spcBef>
+                <a:spcPts val="0"/>
+              </a:spcBef>
+              <a:spcAft>
+                <a:spcPts val="0"/>
+              </a:spcAft>
+              <a:buSzPts val="2600"/>
+              <a:buAutoNum type="arabicPeriod"/>
+            </a:pPr>
+            <a:r>
+              <a:rPr lang="en" sz="2600"/>
+              <a:t>Translate your use cases into </a:t>
+            </a:r>
+            <a:r>
+              <a:rPr lang="en" sz="2600" u="sng"/>
+              <a:t>components</a:t>
+            </a:r>
+            <a:endParaRPr sz="2600" u="sng"/>
+          </a:p>
+          <a:p>
+            <a:pPr indent="-393700" lvl="0" marL="457200" rtl="0" algn="l">
+              <a:spcBef>
+                <a:spcPts val="0"/>
+              </a:spcBef>
+              <a:spcAft>
+                <a:spcPts val="0"/>
+              </a:spcAft>
+              <a:buSzPts val="2600"/>
+              <a:buAutoNum type="arabicPeriod"/>
+            </a:pPr>
+            <a:r>
+              <a:rPr lang="en" sz="2600"/>
+              <a:t>Create a </a:t>
+            </a:r>
+            <a:r>
+              <a:rPr lang="en" sz="2600" u="sng"/>
+              <a:t>specification</a:t>
+            </a:r>
+            <a:r>
+              <a:rPr lang="en" sz="2600"/>
+              <a:t> for each component</a:t>
+            </a:r>
+            <a:endParaRPr sz="2600"/>
+          </a:p>
+          <a:p>
+            <a:pPr indent="0" lvl="0" marL="914400" rtl="0" algn="l">
+              <a:spcBef>
+                <a:spcPts val="1200"/>
+              </a:spcBef>
+              <a:spcAft>
+                <a:spcPts val="0"/>
+              </a:spcAft>
+              <a:buNone/>
+            </a:pPr>
+            <a:r>
+              <a:rPr lang="en" sz="2200"/>
+              <a:t>Potentially including pseudocode</a:t>
+            </a:r>
+            <a:endParaRPr sz="2200"/>
+          </a:p>
+          <a:p>
+            <a:pPr indent="-393700" lvl="0" marL="457200" rtl="0" algn="l">
+              <a:spcBef>
+                <a:spcPts val="1200"/>
+              </a:spcBef>
+              <a:spcAft>
+                <a:spcPts val="0"/>
+              </a:spcAft>
+              <a:buSzPts val="2600"/>
+              <a:buAutoNum type="arabicPeriod"/>
+            </a:pPr>
+            <a:r>
+              <a:rPr lang="en" sz="2600"/>
+              <a:t>Create </a:t>
+            </a:r>
+            <a:r>
+              <a:rPr lang="en" sz="2600" u="sng"/>
+              <a:t>interaction diagrams</a:t>
+            </a:r>
+            <a:r>
+              <a:rPr lang="en" sz="2600"/>
+              <a:t> for how components interact</a:t>
+            </a:r>
+            <a:endParaRPr sz="2600"/>
+          </a:p>
+          <a:p>
+            <a:pPr indent="0" lvl="0" marL="0" rtl="0" algn="l">
+              <a:spcBef>
+                <a:spcPts val="1200"/>
+              </a:spcBef>
+              <a:spcAft>
+                <a:spcPts val="0"/>
+              </a:spcAft>
+              <a:buNone/>
+            </a:pPr>
+            <a:r>
+              <a:rPr lang="en" sz="2400"/>
+              <a:t>Use a Markdown file in the </a:t>
+            </a:r>
+            <a:r>
+              <a:rPr lang="en" sz="2400">
+                <a:latin typeface="Courier New"/>
+                <a:ea typeface="Courier New"/>
+                <a:cs typeface="Courier New"/>
+                <a:sym typeface="Courier New"/>
+              </a:rPr>
+              <a:t>doc</a:t>
+            </a:r>
+            <a:r>
+              <a:rPr lang="en" sz="2400"/>
+              <a:t> directory </a:t>
+            </a:r>
+            <a:endParaRPr sz="2400"/>
+          </a:p>
+          <a:p>
+            <a:pPr indent="0" lvl="0" marL="0" rtl="0" algn="l">
+              <a:spcBef>
+                <a:spcPts val="1200"/>
+              </a:spcBef>
+              <a:spcAft>
+                <a:spcPts val="1200"/>
+              </a:spcAft>
+              <a:buNone/>
+            </a:pPr>
+            <a:r>
+              <a:rPr b="1" lang="en" sz="2400"/>
+              <a:t>Go as deep as you can!</a:t>
+            </a:r>
+            <a:endParaRPr b="1" sz="2400"/>
           </a:p>
         </p:txBody>
       </p:sp>
@@ -23456,6 +25044,760 @@
   <p:clrMapOvr>
     <a:masterClrMapping/>
   </p:clrMapOvr>
+  <p:timing>
+    <p:tnLst>
+      <p:par>
+        <p:cTn dur="indefinite" nodeType="tmRoot" restart="never">
+          <p:childTnLst>
+            <p:seq concurrent="1" nextAc="seek">
+              <p:cTn dur="indefinite" id="2" nodeType="mainSeq">
+                <p:childTnLst>
+                  <p:par>
+                    <p:cTn fill="hold">
+                      <p:stCondLst>
+                        <p:cond delay="indefinite"/>
+                      </p:stCondLst>
+                      <p:childTnLst>
+                        <p:par>
+                          <p:cTn fill="hold">
+                            <p:stCondLst>
+                              <p:cond delay="0"/>
+                            </p:stCondLst>
+                            <p:childTnLst>
+                              <p:par>
+                                <p:cTn fill="hold" nodeType="clickEffect" presetClass="entr" presetID="10" presetSubtype="0">
+                                  <p:stCondLst>
+                                    <p:cond delay="0"/>
+                                  </p:stCondLst>
+                                  <p:childTnLst>
+                                    <p:set>
+                                      <p:cBhvr>
+                                        <p:cTn dur="1" fill="hold">
+                                          <p:stCondLst>
+                                            <p:cond delay="0"/>
+                                          </p:stCondLst>
+                                        </p:cTn>
+                                        <p:tgtEl>
+                                          <p:spTgt spid="122">
+                                            <p:txEl>
+                                              <p:pRg end="0" st="0"/>
+                                            </p:txEl>
+                                          </p:spTgt>
+                                        </p:tgtEl>
+                                        <p:attrNameLst>
+                                          <p:attrName>style.visibility</p:attrName>
+                                        </p:attrNameLst>
+                                      </p:cBhvr>
+                                      <p:to>
+                                        <p:strVal val="visible"/>
+                                      </p:to>
+                                    </p:set>
+                                    <p:animEffect filter="fade" transition="in">
+                                      <p:cBhvr>
+                                        <p:cTn dur="1"/>
+                                        <p:tgtEl>
+                                          <p:spTgt spid="122">
+                                            <p:txEl>
+                                              <p:pRg end="0" st="0"/>
+                                            </p:txEl>
+                                          </p:spTgt>
+                                        </p:tgtEl>
+                                      </p:cBhvr>
+                                    </p:animEffect>
+                                  </p:childTnLst>
+                                </p:cTn>
+                              </p:par>
+                            </p:childTnLst>
+                          </p:cTn>
+                        </p:par>
+                      </p:childTnLst>
+                    </p:cTn>
+                  </p:par>
+                  <p:par>
+                    <p:cTn fill="hold">
+                      <p:stCondLst>
+                        <p:cond delay="indefinite"/>
+                      </p:stCondLst>
+                      <p:childTnLst>
+                        <p:par>
+                          <p:cTn fill="hold">
+                            <p:stCondLst>
+                              <p:cond delay="0"/>
+                            </p:stCondLst>
+                            <p:childTnLst>
+                              <p:par>
+                                <p:cTn fill="hold" nodeType="clickEffect" presetClass="entr" presetID="10" presetSubtype="0">
+                                  <p:stCondLst>
+                                    <p:cond delay="0"/>
+                                  </p:stCondLst>
+                                  <p:childTnLst>
+                                    <p:set>
+                                      <p:cBhvr>
+                                        <p:cTn dur="1" fill="hold">
+                                          <p:stCondLst>
+                                            <p:cond delay="0"/>
+                                          </p:stCondLst>
+                                        </p:cTn>
+                                        <p:tgtEl>
+                                          <p:spTgt spid="122">
+                                            <p:txEl>
+                                              <p:pRg end="1" st="1"/>
+                                            </p:txEl>
+                                          </p:spTgt>
+                                        </p:tgtEl>
+                                        <p:attrNameLst>
+                                          <p:attrName>style.visibility</p:attrName>
+                                        </p:attrNameLst>
+                                      </p:cBhvr>
+                                      <p:to>
+                                        <p:strVal val="visible"/>
+                                      </p:to>
+                                    </p:set>
+                                    <p:animEffect filter="fade" transition="in">
+                                      <p:cBhvr>
+                                        <p:cTn dur="1"/>
+                                        <p:tgtEl>
+                                          <p:spTgt spid="122">
+                                            <p:txEl>
+                                              <p:pRg end="1" st="1"/>
+                                            </p:txEl>
+                                          </p:spTgt>
+                                        </p:tgtEl>
+                                      </p:cBhvr>
+                                    </p:animEffect>
+                                  </p:childTnLst>
+                                </p:cTn>
+                              </p:par>
+                            </p:childTnLst>
+                          </p:cTn>
+                        </p:par>
+                      </p:childTnLst>
+                    </p:cTn>
+                  </p:par>
+                  <p:par>
+                    <p:cTn fill="hold">
+                      <p:stCondLst>
+                        <p:cond delay="indefinite"/>
+                      </p:stCondLst>
+                      <p:childTnLst>
+                        <p:par>
+                          <p:cTn fill="hold">
+                            <p:stCondLst>
+                              <p:cond delay="0"/>
+                            </p:stCondLst>
+                            <p:childTnLst>
+                              <p:par>
+                                <p:cTn fill="hold" nodeType="clickEffect" presetClass="entr" presetID="10" presetSubtype="0">
+                                  <p:stCondLst>
+                                    <p:cond delay="0"/>
+                                  </p:stCondLst>
+                                  <p:childTnLst>
+                                    <p:set>
+                                      <p:cBhvr>
+                                        <p:cTn dur="1" fill="hold">
+                                          <p:stCondLst>
+                                            <p:cond delay="0"/>
+                                          </p:stCondLst>
+                                        </p:cTn>
+                                        <p:tgtEl>
+                                          <p:spTgt spid="122">
+                                            <p:txEl>
+                                              <p:pRg end="2" st="2"/>
+                                            </p:txEl>
+                                          </p:spTgt>
+                                        </p:tgtEl>
+                                        <p:attrNameLst>
+                                          <p:attrName>style.visibility</p:attrName>
+                                        </p:attrNameLst>
+                                      </p:cBhvr>
+                                      <p:to>
+                                        <p:strVal val="visible"/>
+                                      </p:to>
+                                    </p:set>
+                                    <p:animEffect filter="fade" transition="in">
+                                      <p:cBhvr>
+                                        <p:cTn dur="1"/>
+                                        <p:tgtEl>
+                                          <p:spTgt spid="122">
+                                            <p:txEl>
+                                              <p:pRg end="2" st="2"/>
+                                            </p:txEl>
+                                          </p:spTgt>
+                                        </p:tgtEl>
+                                      </p:cBhvr>
+                                    </p:animEffect>
+                                  </p:childTnLst>
+                                </p:cTn>
+                              </p:par>
+                            </p:childTnLst>
+                          </p:cTn>
+                        </p:par>
+                      </p:childTnLst>
+                    </p:cTn>
+                  </p:par>
+                  <p:par>
+                    <p:cTn fill="hold">
+                      <p:stCondLst>
+                        <p:cond delay="indefinite"/>
+                      </p:stCondLst>
+                      <p:childTnLst>
+                        <p:par>
+                          <p:cTn fill="hold">
+                            <p:stCondLst>
+                              <p:cond delay="0"/>
+                            </p:stCondLst>
+                            <p:childTnLst>
+                              <p:par>
+                                <p:cTn fill="hold" nodeType="clickEffect" presetClass="entr" presetID="10" presetSubtype="0">
+                                  <p:stCondLst>
+                                    <p:cond delay="0"/>
+                                  </p:stCondLst>
+                                  <p:childTnLst>
+                                    <p:set>
+                                      <p:cBhvr>
+                                        <p:cTn dur="1" fill="hold">
+                                          <p:stCondLst>
+                                            <p:cond delay="0"/>
+                                          </p:stCondLst>
+                                        </p:cTn>
+                                        <p:tgtEl>
+                                          <p:spTgt spid="122">
+                                            <p:txEl>
+                                              <p:pRg end="3" st="3"/>
+                                            </p:txEl>
+                                          </p:spTgt>
+                                        </p:tgtEl>
+                                        <p:attrNameLst>
+                                          <p:attrName>style.visibility</p:attrName>
+                                        </p:attrNameLst>
+                                      </p:cBhvr>
+                                      <p:to>
+                                        <p:strVal val="visible"/>
+                                      </p:to>
+                                    </p:set>
+                                    <p:animEffect filter="fade" transition="in">
+                                      <p:cBhvr>
+                                        <p:cTn dur="1"/>
+                                        <p:tgtEl>
+                                          <p:spTgt spid="122">
+                                            <p:txEl>
+                                              <p:pRg end="3" st="3"/>
+                                            </p:txEl>
+                                          </p:spTgt>
+                                        </p:tgtEl>
+                                      </p:cBhvr>
+                                    </p:animEffect>
+                                  </p:childTnLst>
+                                </p:cTn>
+                              </p:par>
+                            </p:childTnLst>
+                          </p:cTn>
+                        </p:par>
+                      </p:childTnLst>
+                    </p:cTn>
+                  </p:par>
+                  <p:par>
+                    <p:cTn fill="hold">
+                      <p:stCondLst>
+                        <p:cond delay="indefinite"/>
+                      </p:stCondLst>
+                      <p:childTnLst>
+                        <p:par>
+                          <p:cTn fill="hold">
+                            <p:stCondLst>
+                              <p:cond delay="0"/>
+                            </p:stCondLst>
+                            <p:childTnLst>
+                              <p:par>
+                                <p:cTn fill="hold" nodeType="clickEffect" presetClass="entr" presetID="10" presetSubtype="0">
+                                  <p:stCondLst>
+                                    <p:cond delay="0"/>
+                                  </p:stCondLst>
+                                  <p:childTnLst>
+                                    <p:set>
+                                      <p:cBhvr>
+                                        <p:cTn dur="1" fill="hold">
+                                          <p:stCondLst>
+                                            <p:cond delay="0"/>
+                                          </p:stCondLst>
+                                        </p:cTn>
+                                        <p:tgtEl>
+                                          <p:spTgt spid="122">
+                                            <p:txEl>
+                                              <p:pRg end="4" st="4"/>
+                                            </p:txEl>
+                                          </p:spTgt>
+                                        </p:tgtEl>
+                                        <p:attrNameLst>
+                                          <p:attrName>style.visibility</p:attrName>
+                                        </p:attrNameLst>
+                                      </p:cBhvr>
+                                      <p:to>
+                                        <p:strVal val="visible"/>
+                                      </p:to>
+                                    </p:set>
+                                    <p:animEffect filter="fade" transition="in">
+                                      <p:cBhvr>
+                                        <p:cTn dur="1"/>
+                                        <p:tgtEl>
+                                          <p:spTgt spid="122">
+                                            <p:txEl>
+                                              <p:pRg end="4" st="4"/>
+                                            </p:txEl>
+                                          </p:spTgt>
+                                        </p:tgtEl>
+                                      </p:cBhvr>
+                                    </p:animEffect>
+                                  </p:childTnLst>
+                                </p:cTn>
+                              </p:par>
+                            </p:childTnLst>
+                          </p:cTn>
+                        </p:par>
+                      </p:childTnLst>
+                    </p:cTn>
+                  </p:par>
+                  <p:par>
+                    <p:cTn fill="hold">
+                      <p:stCondLst>
+                        <p:cond delay="indefinite"/>
+                      </p:stCondLst>
+                      <p:childTnLst>
+                        <p:par>
+                          <p:cTn fill="hold">
+                            <p:stCondLst>
+                              <p:cond delay="0"/>
+                            </p:stCondLst>
+                            <p:childTnLst>
+                              <p:par>
+                                <p:cTn fill="hold" nodeType="clickEffect" presetClass="entr" presetID="10" presetSubtype="0">
+                                  <p:stCondLst>
+                                    <p:cond delay="0"/>
+                                  </p:stCondLst>
+                                  <p:childTnLst>
+                                    <p:set>
+                                      <p:cBhvr>
+                                        <p:cTn dur="1" fill="hold">
+                                          <p:stCondLst>
+                                            <p:cond delay="0"/>
+                                          </p:stCondLst>
+                                        </p:cTn>
+                                        <p:tgtEl>
+                                          <p:spTgt spid="122">
+                                            <p:txEl>
+                                              <p:pRg end="5" st="5"/>
+                                            </p:txEl>
+                                          </p:spTgt>
+                                        </p:tgtEl>
+                                        <p:attrNameLst>
+                                          <p:attrName>style.visibility</p:attrName>
+                                        </p:attrNameLst>
+                                      </p:cBhvr>
+                                      <p:to>
+                                        <p:strVal val="visible"/>
+                                      </p:to>
+                                    </p:set>
+                                    <p:animEffect filter="fade" transition="in">
+                                      <p:cBhvr>
+                                        <p:cTn dur="1"/>
+                                        <p:tgtEl>
+                                          <p:spTgt spid="122">
+                                            <p:txEl>
+                                              <p:pRg end="5" st="5"/>
+                                            </p:txEl>
+                                          </p:spTgt>
+                                        </p:tgtEl>
+                                      </p:cBhvr>
+                                    </p:animEffect>
+                                  </p:childTnLst>
+                                </p:cTn>
+                              </p:par>
+                            </p:childTnLst>
+                          </p:cTn>
+                        </p:par>
+                      </p:childTnLst>
+                    </p:cTn>
+                  </p:par>
+                  <p:par>
+                    <p:cTn fill="hold">
+                      <p:stCondLst>
+                        <p:cond delay="indefinite"/>
+                      </p:stCondLst>
+                      <p:childTnLst>
+                        <p:par>
+                          <p:cTn fill="hold">
+                            <p:stCondLst>
+                              <p:cond delay="0"/>
+                            </p:stCondLst>
+                            <p:childTnLst>
+                              <p:par>
+                                <p:cTn fill="hold" nodeType="clickEffect" presetClass="entr" presetID="10" presetSubtype="0">
+                                  <p:stCondLst>
+                                    <p:cond delay="0"/>
+                                  </p:stCondLst>
+                                  <p:childTnLst>
+                                    <p:set>
+                                      <p:cBhvr>
+                                        <p:cTn dur="1" fill="hold">
+                                          <p:stCondLst>
+                                            <p:cond delay="0"/>
+                                          </p:stCondLst>
+                                        </p:cTn>
+                                        <p:tgtEl>
+                                          <p:spTgt spid="122">
+                                            <p:txEl>
+                                              <p:pRg end="6" st="6"/>
+                                            </p:txEl>
+                                          </p:spTgt>
+                                        </p:tgtEl>
+                                        <p:attrNameLst>
+                                          <p:attrName>style.visibility</p:attrName>
+                                        </p:attrNameLst>
+                                      </p:cBhvr>
+                                      <p:to>
+                                        <p:strVal val="visible"/>
+                                      </p:to>
+                                    </p:set>
+                                    <p:animEffect filter="fade" transition="in">
+                                      <p:cBhvr>
+                                        <p:cTn dur="1"/>
+                                        <p:tgtEl>
+                                          <p:spTgt spid="122">
+                                            <p:txEl>
+                                              <p:pRg end="6" st="6"/>
+                                            </p:txEl>
+                                          </p:spTgt>
+                                        </p:tgtEl>
+                                      </p:cBhvr>
+                                    </p:animEffect>
+                                  </p:childTnLst>
+                                </p:cTn>
+                              </p:par>
+                            </p:childTnLst>
+                          </p:cTn>
+                        </p:par>
+                      </p:childTnLst>
+                    </p:cTn>
+                  </p:par>
+                  <p:par>
+                    <p:cTn fill="hold">
+                      <p:stCondLst>
+                        <p:cond delay="indefinite"/>
+                      </p:stCondLst>
+                      <p:childTnLst>
+                        <p:par>
+                          <p:cTn fill="hold">
+                            <p:stCondLst>
+                              <p:cond delay="0"/>
+                            </p:stCondLst>
+                            <p:childTnLst>
+                              <p:par>
+                                <p:cTn fill="hold" nodeType="clickEffect" presetClass="entr" presetID="10" presetSubtype="0">
+                                  <p:stCondLst>
+                                    <p:cond delay="0"/>
+                                  </p:stCondLst>
+                                  <p:childTnLst>
+                                    <p:set>
+                                      <p:cBhvr>
+                                        <p:cTn dur="1" fill="hold">
+                                          <p:stCondLst>
+                                            <p:cond delay="0"/>
+                                          </p:stCondLst>
+                                        </p:cTn>
+                                        <p:tgtEl>
+                                          <p:spTgt spid="122">
+                                            <p:txEl>
+                                              <p:pRg end="7" st="7"/>
+                                            </p:txEl>
+                                          </p:spTgt>
+                                        </p:tgtEl>
+                                        <p:attrNameLst>
+                                          <p:attrName>style.visibility</p:attrName>
+                                        </p:attrNameLst>
+                                      </p:cBhvr>
+                                      <p:to>
+                                        <p:strVal val="visible"/>
+                                      </p:to>
+                                    </p:set>
+                                    <p:animEffect filter="fade" transition="in">
+                                      <p:cBhvr>
+                                        <p:cTn dur="1"/>
+                                        <p:tgtEl>
+                                          <p:spTgt spid="122">
+                                            <p:txEl>
+                                              <p:pRg end="7" st="7"/>
+                                            </p:txEl>
+                                          </p:spTgt>
+                                        </p:tgtEl>
+                                      </p:cBhvr>
+                                    </p:animEffect>
+                                  </p:childTnLst>
+                                </p:cTn>
+                              </p:par>
+                            </p:childTnLst>
+                          </p:cTn>
+                        </p:par>
+                      </p:childTnLst>
+                    </p:cTn>
+                  </p:par>
+                  <p:par>
+                    <p:cTn fill="hold">
+                      <p:stCondLst>
+                        <p:cond delay="indefinite"/>
+                      </p:stCondLst>
+                      <p:childTnLst>
+                        <p:par>
+                          <p:cTn fill="hold">
+                            <p:stCondLst>
+                              <p:cond delay="0"/>
+                            </p:stCondLst>
+                            <p:childTnLst>
+                              <p:par>
+                                <p:cTn fill="hold" nodeType="clickEffect" presetClass="entr" presetID="10" presetSubtype="0">
+                                  <p:stCondLst>
+                                    <p:cond delay="0"/>
+                                  </p:stCondLst>
+                                  <p:childTnLst>
+                                    <p:set>
+                                      <p:cBhvr>
+                                        <p:cTn dur="1" fill="hold">
+                                          <p:stCondLst>
+                                            <p:cond delay="0"/>
+                                          </p:stCondLst>
+                                        </p:cTn>
+                                        <p:tgtEl>
+                                          <p:spTgt spid="122">
+                                            <p:txEl>
+                                              <p:pRg end="8" st="8"/>
+                                            </p:txEl>
+                                          </p:spTgt>
+                                        </p:tgtEl>
+                                        <p:attrNameLst>
+                                          <p:attrName>style.visibility</p:attrName>
+                                        </p:attrNameLst>
+                                      </p:cBhvr>
+                                      <p:to>
+                                        <p:strVal val="visible"/>
+                                      </p:to>
+                                    </p:set>
+                                    <p:animEffect filter="fade" transition="in">
+                                      <p:cBhvr>
+                                        <p:cTn dur="1"/>
+                                        <p:tgtEl>
+                                          <p:spTgt spid="122">
+                                            <p:txEl>
+                                              <p:pRg end="8" st="8"/>
+                                            </p:txEl>
+                                          </p:spTgt>
+                                        </p:tgtEl>
+                                      </p:cBhvr>
+                                    </p:animEffect>
+                                  </p:childTnLst>
+                                </p:cTn>
+                              </p:par>
+                            </p:childTnLst>
+                          </p:cTn>
+                        </p:par>
+                      </p:childTnLst>
+                    </p:cTn>
+                  </p:par>
+                  <p:par>
+                    <p:cTn fill="hold">
+                      <p:stCondLst>
+                        <p:cond delay="indefinite"/>
+                      </p:stCondLst>
+                      <p:childTnLst>
+                        <p:par>
+                          <p:cTn fill="hold">
+                            <p:stCondLst>
+                              <p:cond delay="0"/>
+                            </p:stCondLst>
+                            <p:childTnLst>
+                              <p:par>
+                                <p:cTn fill="hold" nodeType="clickEffect" presetClass="entr" presetID="10" presetSubtype="0">
+                                  <p:stCondLst>
+                                    <p:cond delay="0"/>
+                                  </p:stCondLst>
+                                  <p:childTnLst>
+                                    <p:set>
+                                      <p:cBhvr>
+                                        <p:cTn dur="1" fill="hold">
+                                          <p:stCondLst>
+                                            <p:cond delay="0"/>
+                                          </p:stCondLst>
+                                        </p:cTn>
+                                        <p:tgtEl>
+                                          <p:spTgt spid="122">
+                                            <p:txEl>
+                                              <p:pRg end="9" st="9"/>
+                                            </p:txEl>
+                                          </p:spTgt>
+                                        </p:tgtEl>
+                                        <p:attrNameLst>
+                                          <p:attrName>style.visibility</p:attrName>
+                                        </p:attrNameLst>
+                                      </p:cBhvr>
+                                      <p:to>
+                                        <p:strVal val="visible"/>
+                                      </p:to>
+                                    </p:set>
+                                    <p:animEffect filter="fade" transition="in">
+                                      <p:cBhvr>
+                                        <p:cTn dur="1"/>
+                                        <p:tgtEl>
+                                          <p:spTgt spid="122">
+                                            <p:txEl>
+                                              <p:pRg end="9" st="9"/>
+                                            </p:txEl>
+                                          </p:spTgt>
+                                        </p:tgtEl>
+                                      </p:cBhvr>
+                                    </p:animEffect>
+                                  </p:childTnLst>
+                                </p:cTn>
+                              </p:par>
+                            </p:childTnLst>
+                          </p:cTn>
+                        </p:par>
+                      </p:childTnLst>
+                    </p:cTn>
+                  </p:par>
+                  <p:par>
+                    <p:cTn fill="hold">
+                      <p:stCondLst>
+                        <p:cond delay="indefinite"/>
+                      </p:stCondLst>
+                      <p:childTnLst>
+                        <p:par>
+                          <p:cTn fill="hold">
+                            <p:stCondLst>
+                              <p:cond delay="0"/>
+                            </p:stCondLst>
+                            <p:childTnLst>
+                              <p:par>
+                                <p:cTn fill="hold" nodeType="clickEffect" presetClass="entr" presetID="10" presetSubtype="0">
+                                  <p:stCondLst>
+                                    <p:cond delay="0"/>
+                                  </p:stCondLst>
+                                  <p:childTnLst>
+                                    <p:set>
+                                      <p:cBhvr>
+                                        <p:cTn dur="1" fill="hold">
+                                          <p:stCondLst>
+                                            <p:cond delay="0"/>
+                                          </p:stCondLst>
+                                        </p:cTn>
+                                        <p:tgtEl>
+                                          <p:spTgt spid="122">
+                                            <p:txEl>
+                                              <p:pRg end="10" st="10"/>
+                                            </p:txEl>
+                                          </p:spTgt>
+                                        </p:tgtEl>
+                                        <p:attrNameLst>
+                                          <p:attrName>style.visibility</p:attrName>
+                                        </p:attrNameLst>
+                                      </p:cBhvr>
+                                      <p:to>
+                                        <p:strVal val="visible"/>
+                                      </p:to>
+                                    </p:set>
+                                    <p:animEffect filter="fade" transition="in">
+                                      <p:cBhvr>
+                                        <p:cTn dur="1"/>
+                                        <p:tgtEl>
+                                          <p:spTgt spid="122">
+                                            <p:txEl>
+                                              <p:pRg end="10" st="10"/>
+                                            </p:txEl>
+                                          </p:spTgt>
+                                        </p:tgtEl>
+                                      </p:cBhvr>
+                                    </p:animEffect>
+                                  </p:childTnLst>
+                                </p:cTn>
+                              </p:par>
+                            </p:childTnLst>
+                          </p:cTn>
+                        </p:par>
+                      </p:childTnLst>
+                    </p:cTn>
+                  </p:par>
+                  <p:par>
+                    <p:cTn fill="hold">
+                      <p:stCondLst>
+                        <p:cond delay="indefinite"/>
+                      </p:stCondLst>
+                      <p:childTnLst>
+                        <p:par>
+                          <p:cTn fill="hold">
+                            <p:stCondLst>
+                              <p:cond delay="0"/>
+                            </p:stCondLst>
+                            <p:childTnLst>
+                              <p:par>
+                                <p:cTn fill="hold" nodeType="clickEffect" presetClass="entr" presetID="10" presetSubtype="0">
+                                  <p:stCondLst>
+                                    <p:cond delay="0"/>
+                                  </p:stCondLst>
+                                  <p:childTnLst>
+                                    <p:set>
+                                      <p:cBhvr>
+                                        <p:cTn dur="1" fill="hold">
+                                          <p:stCondLst>
+                                            <p:cond delay="0"/>
+                                          </p:stCondLst>
+                                        </p:cTn>
+                                        <p:tgtEl>
+                                          <p:spTgt spid="123"/>
+                                        </p:tgtEl>
+                                        <p:attrNameLst>
+                                          <p:attrName>style.visibility</p:attrName>
+                                        </p:attrNameLst>
+                                      </p:cBhvr>
+                                      <p:to>
+                                        <p:strVal val="visible"/>
+                                      </p:to>
+                                    </p:set>
+                                    <p:animEffect filter="fade" transition="in">
+                                      <p:cBhvr>
+                                        <p:cTn dur="1"/>
+                                        <p:tgtEl>
+                                          <p:spTgt spid="123"/>
+                                        </p:tgtEl>
+                                      </p:cBhvr>
+                                    </p:animEffect>
+                                  </p:childTnLst>
+                                </p:cTn>
+                              </p:par>
+                            </p:childTnLst>
+                          </p:cTn>
+                        </p:par>
+                      </p:childTnLst>
+                    </p:cTn>
+                  </p:par>
+                </p:childTnLst>
+              </p:cTn>
+              <p:prevCondLst>
+                <p:cond evt="onPrev">
+                  <p:tgtEl>
+                    <p:sldTgt/>
+                  </p:tgtEl>
+                </p:cond>
+              </p:prevCondLst>
+              <p:nextCondLst>
+                <p:cond evt="onNext">
+                  <p:tgtEl>
+                    <p:sldTgt/>
+                  </p:tgtEl>
+                </p:cond>
+              </p:nextCondLst>
+            </p:seq>
+          </p:childTnLst>
+        </p:cTn>
+      </p:par>
+    </p:tnLst>
+  </p:timing>
 </p:sld>
 </file>
 

</xml_diff>